<commit_message>
Add auto-fit font sizing for shapes with dimension-based calculation and PowerPoint normAutofit support
- Implement `calculate_font_size()` to compute optimal font size based on shape width/height and text content (accounts for multi-line text, character count, usable area with 10% padding)
- Clamp font size to 8pt-44pt range (800-4400 hundredths)
- Add PowerPoint `normAutofit` element to shape text body for additional scaling safety
- Rename `generate_text_xml()` to `generate_text_xml_with_autofit()` with
</commit_message>
<xml_diff>
--- a/examples/md2ppt_demo.pptx
+++ b/examples/md2ppt_demo.pptx
@@ -732,12 +732,14 @@
           </a:prstGeom>
         </p:spPr>
         <p:txBody>
-          <a:bodyPr wrap="square" rtlCol="0" anchor="ctr"/>
-          <a:lstStyle/>
-          <a:p>
-            <a:pPr algn="ctr"/>
-            <a:r>
-              <a:rPr lang="en-US" sz="1800" dirty="0"/>
+          <a:bodyPr wrap="square" rtlCol="0" anchor="ctr">
+            <a:normAutofit/>
+          </a:bodyPr>
+          <a:lstStyle/>
+          <a:p>
+            <a:pPr algn="ctr"/>
+            <a:r>
+              <a:rPr lang="en-US" sz="2519" dirty="0"/>
               <a:t>Product Development Schedule</a:t>
             </a:r>
           </a:p>
@@ -762,12 +764,14 @@
           </a:solidFill>
         </p:spPr>
         <p:txBody>
-          <a:bodyPr wrap="square" rtlCol="0" anchor="ctr"/>
-          <a:lstStyle/>
-          <a:p>
-            <a:pPr algn="ctr"/>
-            <a:r>
-              <a:rPr lang="en-US" sz="1800" dirty="0"/>
+          <a:bodyPr wrap="square" rtlCol="0" anchor="ctr">
+            <a:normAutofit/>
+          </a:bodyPr>
+          <a:lstStyle/>
+          <a:p>
+            <a:pPr algn="ctr"/>
+            <a:r>
+              <a:rPr lang="en-US" sz="1889" dirty="0"/>
               <a:t>Planning</a:t>
             </a:r>
           </a:p>
@@ -789,12 +793,14 @@
           </a:prstGeom>
         </p:spPr>
         <p:txBody>
-          <a:bodyPr wrap="square" rtlCol="0" anchor="ctr"/>
-          <a:lstStyle/>
-          <a:p>
-            <a:pPr algn="ctr"/>
-            <a:r>
-              <a:rPr lang="en-US" sz="1800" dirty="0"/>
+          <a:bodyPr wrap="square" rtlCol="0" anchor="ctr">
+            <a:normAutofit/>
+          </a:bodyPr>
+          <a:lstStyle/>
+          <a:p>
+            <a:pPr algn="ctr"/>
+            <a:r>
+              <a:rPr lang="en-US" sz="1574" dirty="0"/>
               <a:t>Requirements</a:t>
             </a:r>
           </a:p>
@@ -840,12 +846,14 @@
           </a:prstGeom>
         </p:spPr>
         <p:txBody>
-          <a:bodyPr wrap="square" rtlCol="0" anchor="ctr"/>
-          <a:lstStyle/>
-          <a:p>
-            <a:pPr algn="ctr"/>
-            <a:r>
-              <a:rPr lang="en-US" sz="1800" dirty="0"/>
+          <a:bodyPr wrap="square" rtlCol="0" anchor="ctr">
+            <a:normAutofit/>
+          </a:bodyPr>
+          <a:lstStyle/>
+          <a:p>
+            <a:pPr algn="ctr"/>
+            <a:r>
+              <a:rPr lang="en-US" sz="1574" dirty="0"/>
               <a:t>Design</a:t>
             </a:r>
           </a:p>
@@ -894,12 +902,14 @@
           </a:solidFill>
         </p:spPr>
         <p:txBody>
-          <a:bodyPr wrap="square" rtlCol="0" anchor="ctr"/>
-          <a:lstStyle/>
-          <a:p>
-            <a:pPr algn="ctr"/>
-            <a:r>
-              <a:rPr lang="en-US" sz="1800" dirty="0"/>
+          <a:bodyPr wrap="square" rtlCol="0" anchor="ctr">
+            <a:normAutofit/>
+          </a:bodyPr>
+          <a:lstStyle/>
+          <a:p>
+            <a:pPr algn="ctr"/>
+            <a:r>
+              <a:rPr lang="en-US" sz="1889" dirty="0"/>
               <a:t>Development</a:t>
             </a:r>
           </a:p>
@@ -921,12 +931,14 @@
           </a:prstGeom>
         </p:spPr>
         <p:txBody>
-          <a:bodyPr wrap="square" rtlCol="0" anchor="ctr"/>
-          <a:lstStyle/>
-          <a:p>
-            <a:pPr algn="ctr"/>
-            <a:r>
-              <a:rPr lang="en-US" sz="1800" dirty="0"/>
+          <a:bodyPr wrap="square" rtlCol="0" anchor="ctr">
+            <a:normAutofit/>
+          </a:bodyPr>
+          <a:lstStyle/>
+          <a:p>
+            <a:pPr algn="ctr"/>
+            <a:r>
+              <a:rPr lang="en-US" sz="1574" dirty="0"/>
               <a:t>Backend API</a:t>
             </a:r>
           </a:p>
@@ -972,12 +984,14 @@
           </a:prstGeom>
         </p:spPr>
         <p:txBody>
-          <a:bodyPr wrap="square" rtlCol="0" anchor="ctr"/>
-          <a:lstStyle/>
-          <a:p>
-            <a:pPr algn="ctr"/>
-            <a:r>
-              <a:rPr lang="en-US" sz="1800" dirty="0"/>
+          <a:bodyPr wrap="square" rtlCol="0" anchor="ctr">
+            <a:normAutofit/>
+          </a:bodyPr>
+          <a:lstStyle/>
+          <a:p>
+            <a:pPr algn="ctr"/>
+            <a:r>
+              <a:rPr lang="en-US" sz="1574" dirty="0"/>
               <a:t>Frontend UI</a:t>
             </a:r>
           </a:p>
@@ -1023,12 +1037,14 @@
           </a:prstGeom>
         </p:spPr>
         <p:txBody>
-          <a:bodyPr wrap="square" rtlCol="0" anchor="ctr"/>
-          <a:lstStyle/>
-          <a:p>
-            <a:pPr algn="ctr"/>
-            <a:r>
-              <a:rPr lang="en-US" sz="1800" dirty="0"/>
+          <a:bodyPr wrap="square" rtlCol="0" anchor="ctr">
+            <a:normAutofit/>
+          </a:bodyPr>
+          <a:lstStyle/>
+          <a:p>
+            <a:pPr algn="ctr"/>
+            <a:r>
+              <a:rPr lang="en-US" sz="1574" dirty="0"/>
               <a:t>Integration</a:t>
             </a:r>
           </a:p>
@@ -1077,12 +1093,14 @@
           </a:solidFill>
         </p:spPr>
         <p:txBody>
-          <a:bodyPr wrap="square" rtlCol="0" anchor="ctr"/>
-          <a:lstStyle/>
-          <a:p>
-            <a:pPr algn="ctr"/>
-            <a:r>
-              <a:rPr lang="en-US" sz="1800" dirty="0"/>
+          <a:bodyPr wrap="square" rtlCol="0" anchor="ctr">
+            <a:normAutofit/>
+          </a:bodyPr>
+          <a:lstStyle/>
+          <a:p>
+            <a:pPr algn="ctr"/>
+            <a:r>
+              <a:rPr lang="en-US" sz="1889" dirty="0"/>
               <a:t>Testing</a:t>
             </a:r>
           </a:p>
@@ -1104,12 +1122,14 @@
           </a:prstGeom>
         </p:spPr>
         <p:txBody>
-          <a:bodyPr wrap="square" rtlCol="0" anchor="ctr"/>
-          <a:lstStyle/>
-          <a:p>
-            <a:pPr algn="ctr"/>
-            <a:r>
-              <a:rPr lang="en-US" sz="1800" dirty="0"/>
+          <a:bodyPr wrap="square" rtlCol="0" anchor="ctr">
+            <a:normAutofit/>
+          </a:bodyPr>
+          <a:lstStyle/>
+          <a:p>
+            <a:pPr algn="ctr"/>
+            <a:r>
+              <a:rPr lang="en-US" sz="1574" dirty="0"/>
               <a:t>QA Testing</a:t>
             </a:r>
           </a:p>
@@ -1155,12 +1175,14 @@
           </a:prstGeom>
         </p:spPr>
         <p:txBody>
-          <a:bodyPr wrap="square" rtlCol="0" anchor="ctr"/>
-          <a:lstStyle/>
-          <a:p>
-            <a:pPr algn="ctr"/>
-            <a:r>
-              <a:rPr lang="en-US" sz="1800" dirty="0"/>
+          <a:bodyPr wrap="square" rtlCol="0" anchor="ctr">
+            <a:normAutofit/>
+          </a:bodyPr>
+          <a:lstStyle/>
+          <a:p>
+            <a:pPr algn="ctr"/>
+            <a:r>
+              <a:rPr lang="en-US" sz="1574" dirty="0"/>
               <a:t>UAT</a:t>
             </a:r>
           </a:p>
@@ -1209,12 +1231,14 @@
           </a:solidFill>
         </p:spPr>
         <p:txBody>
-          <a:bodyPr wrap="square" rtlCol="0" anchor="ctr"/>
-          <a:lstStyle/>
-          <a:p>
-            <a:pPr algn="ctr"/>
-            <a:r>
-              <a:rPr lang="en-US" sz="1800" dirty="0"/>
+          <a:bodyPr wrap="square" rtlCol="0" anchor="ctr">
+            <a:normAutofit/>
+          </a:bodyPr>
+          <a:lstStyle/>
+          <a:p>
+            <a:pPr algn="ctr"/>
+            <a:r>
+              <a:rPr lang="en-US" sz="1889" dirty="0"/>
               <a:t>Launch</a:t>
             </a:r>
           </a:p>
@@ -1236,12 +1260,14 @@
           </a:prstGeom>
         </p:spPr>
         <p:txBody>
-          <a:bodyPr wrap="square" rtlCol="0" anchor="ctr"/>
-          <a:lstStyle/>
-          <a:p>
-            <a:pPr algn="ctr"/>
-            <a:r>
-              <a:rPr lang="en-US" sz="1800" dirty="0"/>
+          <a:bodyPr wrap="square" rtlCol="0" anchor="ctr">
+            <a:normAutofit/>
+          </a:bodyPr>
+          <a:lstStyle/>
+          <a:p>
+            <a:pPr algn="ctr"/>
+            <a:r>
+              <a:rPr lang="en-US" sz="1574" dirty="0"/>
               <a:t>Deployment</a:t>
             </a:r>
           </a:p>
@@ -1353,13 +1379,15 @@
           </a:ln>
         </p:spPr>
         <p:txBody>
-          <a:bodyPr wrap="square" rtlCol="0" anchor="ctr"/>
-          <a:lstStyle/>
-          <a:p>
-            <a:pPr algn="ctr"/>
-            <a:r>
-              <a:rPr lang="en-US" sz="1800" dirty="0"/>
-              <a:t>ORDER</a:t>
+          <a:bodyPr wrap="square" rtlCol="0" anchor="ctr">
+            <a:normAutofit/>
+          </a:bodyPr>
+          <a:lstStyle/>
+          <a:p>
+            <a:pPr algn="ctr"/>
+            <a:r>
+              <a:rPr lang="en-US" sz="2519" dirty="0"/>
+              <a:t>ntains</a:t>
             </a:r>
           </a:p>
         </p:txBody>
@@ -1373,7 +1401,7 @@
         <p:spPr>
           <a:xfrm>
             <a:off x="500000" y="2000000"/>
-            <a:ext cx="2200000" cy="1120000"/>
+            <a:ext cx="2200000" cy="280000"/>
           </a:xfrm>
           <a:prstGeom prst="rect">
             <a:avLst/>
@@ -1388,16 +1416,15 @@
           </a:ln>
         </p:spPr>
         <p:txBody>
-          <a:bodyPr wrap="square" rtlCol="0" anchor="ctr"/>
-          <a:lstStyle/>
-          <a:p>
-            <a:pPr algn="ctr"/>
-            <a:r>
-              <a:rPr lang="en-US" sz="1800" dirty="0"/>
-              <a:t>int id PK
-int user_id FK
-date order_date
-decimal total</a:t>
+          <a:bodyPr wrap="square" rtlCol="0" anchor="ctr">
+            <a:normAutofit/>
+          </a:bodyPr>
+          <a:lstStyle/>
+          <a:p>
+            <a:pPr algn="ctr"/>
+            <a:r>
+              <a:rPr lang="en-US" sz="1763" dirty="0"/>
+              <a:t/>
             </a:r>
           </a:p>
         </p:txBody>
@@ -1426,13 +1453,15 @@
           </a:ln>
         </p:spPr>
         <p:txBody>
-          <a:bodyPr wrap="square" rtlCol="0" anchor="ctr"/>
-          <a:lstStyle/>
-          <a:p>
-            <a:pPr algn="ctr"/>
-            <a:r>
-              <a:rPr lang="en-US" sz="1800" dirty="0"/>
-              <a:t>PRODUCT</a:t>
+          <a:bodyPr wrap="square" rtlCol="0" anchor="ctr">
+            <a:normAutofit/>
+          </a:bodyPr>
+          <a:lstStyle/>
+          <a:p>
+            <a:pPr algn="ctr"/>
+            <a:r>
+              <a:rPr lang="en-US" sz="2519" dirty="0"/>
+              <a:t>LINE_ITEM</a:t>
             </a:r>
           </a:p>
         </p:txBody>
@@ -1461,16 +1490,18 @@
           </a:ln>
         </p:spPr>
         <p:txBody>
-          <a:bodyPr wrap="square" rtlCol="0" anchor="ctr"/>
-          <a:lstStyle/>
-          <a:p>
-            <a:pPr algn="ctr"/>
-            <a:r>
-              <a:rPr lang="en-US" sz="1800" dirty="0"/>
+          <a:bodyPr wrap="square" rtlCol="0" anchor="ctr">
+            <a:normAutofit/>
+          </a:bodyPr>
+          <a:lstStyle/>
+          <a:p>
+            <a:pPr algn="ctr"/>
+            <a:r>
+              <a:rPr lang="en-US" sz="1763" dirty="0"/>
               <a:t>int id PK
-string name
-decimal price
-int stock</a:t>
+int order_id FK
+int product_id FK
+int quantity</a:t>
             </a:r>
           </a:p>
         </p:txBody>
@@ -1499,12 +1530,14 @@
           </a:ln>
         </p:spPr>
         <p:txBody>
-          <a:bodyPr wrap="square" rtlCol="0" anchor="ctr"/>
-          <a:lstStyle/>
-          <a:p>
-            <a:pPr algn="ctr"/>
-            <a:r>
-              <a:rPr lang="en-US" sz="1800" dirty="0"/>
+          <a:bodyPr wrap="square" rtlCol="0" anchor="ctr">
+            <a:normAutofit/>
+          </a:bodyPr>
+          <a:lstStyle/>
+          <a:p>
+            <a:pPr algn="ctr"/>
+            <a:r>
+              <a:rPr lang="en-US" sz="2519" dirty="0"/>
               <a:t>USER</a:t>
             </a:r>
           </a:p>
@@ -1534,12 +1567,14 @@
           </a:ln>
         </p:spPr>
         <p:txBody>
-          <a:bodyPr wrap="square" rtlCol="0" anchor="ctr"/>
-          <a:lstStyle/>
-          <a:p>
-            <a:pPr algn="ctr"/>
-            <a:r>
-              <a:rPr lang="en-US" sz="1800" dirty="0"/>
+          <a:bodyPr wrap="square" rtlCol="0" anchor="ctr">
+            <a:normAutofit/>
+          </a:bodyPr>
+          <a:lstStyle/>
+          <a:p>
+            <a:pPr algn="ctr"/>
+            <a:r>
+              <a:rPr lang="en-US" sz="1763" dirty="0"/>
               <a:t>int id PK
 string name
 string email
@@ -1572,13 +1607,15 @@
           </a:ln>
         </p:spPr>
         <p:txBody>
-          <a:bodyPr wrap="square" rtlCol="0" anchor="ctr"/>
-          <a:lstStyle/>
-          <a:p>
-            <a:pPr algn="ctr"/>
-            <a:r>
-              <a:rPr lang="en-US" sz="1800" dirty="0"/>
-              <a:t>rdered in"</a:t>
+          <a:bodyPr wrap="square" rtlCol="0" anchor="ctr">
+            <a:normAutofit/>
+          </a:bodyPr>
+          <a:lstStyle/>
+          <a:p>
+            <a:pPr algn="ctr"/>
+            <a:r>
+              <a:rPr lang="en-US" sz="2519" dirty="0"/>
+              <a:t>PRODUCT</a:t>
             </a:r>
           </a:p>
         </p:txBody>
@@ -1592,7 +1629,7 @@
         <p:spPr>
           <a:xfrm>
             <a:off x="500000" y="4500000"/>
-            <a:ext cx="2200000" cy="280000"/>
+            <a:ext cx="2200000" cy="1120000"/>
           </a:xfrm>
           <a:prstGeom prst="rect">
             <a:avLst/>
@@ -1607,13 +1644,18 @@
           </a:ln>
         </p:spPr>
         <p:txBody>
-          <a:bodyPr wrap="square" rtlCol="0" anchor="ctr"/>
-          <a:lstStyle/>
-          <a:p>
-            <a:pPr algn="ctr"/>
-            <a:r>
-              <a:rPr lang="en-US" sz="1800" dirty="0"/>
-              <a:t/>
+          <a:bodyPr wrap="square" rtlCol="0" anchor="ctr">
+            <a:normAutofit/>
+          </a:bodyPr>
+          <a:lstStyle/>
+          <a:p>
+            <a:pPr algn="ctr"/>
+            <a:r>
+              <a:rPr lang="en-US" sz="1763" dirty="0"/>
+              <a:t>int id PK
+string name
+decimal price
+int stock</a:t>
             </a:r>
           </a:p>
         </p:txBody>
@@ -1642,13 +1684,15 @@
           </a:ln>
         </p:spPr>
         <p:txBody>
-          <a:bodyPr wrap="square" rtlCol="0" anchor="ctr"/>
-          <a:lstStyle/>
-          <a:p>
-            <a:pPr algn="ctr"/>
-            <a:r>
-              <a:rPr lang="en-US" sz="1800" dirty="0"/>
-              <a:t>ntains</a:t>
+          <a:bodyPr wrap="square" rtlCol="0" anchor="ctr">
+            <a:normAutofit/>
+          </a:bodyPr>
+          <a:lstStyle/>
+          <a:p>
+            <a:pPr algn="ctr"/>
+            <a:r>
+              <a:rPr lang="en-US" sz="2519" dirty="0"/>
+              <a:t>ORDER</a:t>
             </a:r>
           </a:p>
         </p:txBody>
@@ -1662,7 +1706,7 @@
         <p:spPr>
           <a:xfrm>
             <a:off x="3300000" y="4500000"/>
-            <a:ext cx="2200000" cy="280000"/>
+            <a:ext cx="2200000" cy="1120000"/>
           </a:xfrm>
           <a:prstGeom prst="rect">
             <a:avLst/>
@@ -1677,13 +1721,18 @@
           </a:ln>
         </p:spPr>
         <p:txBody>
-          <a:bodyPr wrap="square" rtlCol="0" anchor="ctr"/>
-          <a:lstStyle/>
-          <a:p>
-            <a:pPr algn="ctr"/>
-            <a:r>
-              <a:rPr lang="en-US" sz="1800" dirty="0"/>
-              <a:t/>
+          <a:bodyPr wrap="square" rtlCol="0" anchor="ctr">
+            <a:normAutofit/>
+          </a:bodyPr>
+          <a:lstStyle/>
+          <a:p>
+            <a:pPr algn="ctr"/>
+            <a:r>
+              <a:rPr lang="en-US" sz="1763" dirty="0"/>
+              <a:t>int id PK
+int user_id FK
+date order_date
+decimal total</a:t>
             </a:r>
           </a:p>
         </p:txBody>
@@ -1712,13 +1761,15 @@
           </a:ln>
         </p:spPr>
         <p:txBody>
-          <a:bodyPr wrap="square" rtlCol="0" anchor="ctr"/>
-          <a:lstStyle/>
-          <a:p>
-            <a:pPr algn="ctr"/>
-            <a:r>
-              <a:rPr lang="en-US" sz="1800" dirty="0"/>
-              <a:t>LINE_ITEM</a:t>
+          <a:bodyPr wrap="square" rtlCol="0" anchor="ctr">
+            <a:normAutofit/>
+          </a:bodyPr>
+          <a:lstStyle/>
+          <a:p>
+            <a:pPr algn="ctr"/>
+            <a:r>
+              <a:rPr lang="en-US" sz="2519" dirty="0"/>
+              <a:t>rdered in"</a:t>
             </a:r>
           </a:p>
         </p:txBody>
@@ -1732,7 +1783,7 @@
         <p:spPr>
           <a:xfrm>
             <a:off x="6100000" y="4500000"/>
-            <a:ext cx="2200000" cy="1120000"/>
+            <a:ext cx="2200000" cy="280000"/>
           </a:xfrm>
           <a:prstGeom prst="rect">
             <a:avLst/>
@@ -1747,16 +1798,15 @@
           </a:ln>
         </p:spPr>
         <p:txBody>
-          <a:bodyPr wrap="square" rtlCol="0" anchor="ctr"/>
-          <a:lstStyle/>
-          <a:p>
-            <a:pPr algn="ctr"/>
-            <a:r>
-              <a:rPr lang="en-US" sz="1800" dirty="0"/>
-              <a:t>int id PK
-int order_id FK
-int product_id FK
-int quantity</a:t>
+          <a:bodyPr wrap="square" rtlCol="0" anchor="ctr">
+            <a:normAutofit/>
+          </a:bodyPr>
+          <a:lstStyle/>
+          <a:p>
+            <a:pPr algn="ctr"/>
+            <a:r>
+              <a:rPr lang="en-US" sz="1763" dirty="0"/>
+              <a:t/>
             </a:r>
           </a:p>
         </p:txBody>
@@ -1769,9 +1819,9 @@
           <p:nvPr/>
         </p:nvCxnSpPr>
         <p:spPr>
-          <a:xfrm>
-            <a:off x="2700000" y="1800000"/>
-            <a:ext cx="600000" cy="2500000"/>
+          <a:xfrm flipH="1" flipV="1">
+            <a:off x="500000" y="1800000"/>
+            <a:ext cx="5000000" cy="2500000"/>
           </a:xfrm>
           <a:prstGeom prst="bentConnector3">
             <a:avLst/>
@@ -1793,9 +1843,9 @@
           <p:nvPr/>
         </p:nvCxnSpPr>
         <p:spPr>
-          <a:xfrm flipH="1">
-            <a:off x="500000" y="1800000"/>
-            <a:ext cx="5000000" cy="2500000"/>
+          <a:xfrm>
+            <a:off x="2700000" y="4300000"/>
+            <a:ext cx="3400000" cy="0"/>
           </a:xfrm>
           <a:prstGeom prst="bentConnector3">
             <a:avLst/>
@@ -1891,12 +1941,14 @@
           </a:ln>
         </p:spPr>
         <p:txBody>
-          <a:bodyPr wrap="square" rtlCol="0" anchor="ctr"/>
-          <a:lstStyle/>
-          <a:p>
-            <a:pPr algn="ctr"/>
-            <a:r>
-              <a:rPr lang="en-US" sz="1800" dirty="0"/>
+          <a:bodyPr wrap="square" rtlCol="0" anchor="ctr">
+            <a:normAutofit/>
+          </a:bodyPr>
+          <a:lstStyle/>
+          <a:p>
+            <a:pPr algn="ctr"/>
+            <a:r>
+              <a:rPr lang="en-US" sz="3149" dirty="0"/>
               <a:t>Start</a:t>
             </a:r>
           </a:p>
@@ -1926,12 +1978,14 @@
           </a:ln>
         </p:spPr>
         <p:txBody>
-          <a:bodyPr wrap="square" rtlCol="0" anchor="ctr"/>
-          <a:lstStyle/>
-          <a:p>
-            <a:pPr algn="ctr"/>
-            <a:r>
-              <a:rPr lang="en-US" sz="1800" dirty="0"/>
+          <a:bodyPr wrap="square" rtlCol="0" anchor="ctr">
+            <a:normAutofit/>
+          </a:bodyPr>
+          <a:lstStyle/>
+          <a:p>
+            <a:pPr algn="ctr"/>
+            <a:r>
+              <a:rPr lang="en-US" sz="3149" dirty="0"/>
               <a:t>Idle</a:t>
             </a:r>
           </a:p>
@@ -1961,12 +2015,14 @@
           </a:ln>
         </p:spPr>
         <p:txBody>
-          <a:bodyPr wrap="square" rtlCol="0" anchor="ctr"/>
-          <a:lstStyle/>
-          <a:p>
-            <a:pPr algn="ctr"/>
-            <a:r>
-              <a:rPr lang="en-US" sz="1800" dirty="0"/>
+          <a:bodyPr wrap="square" rtlCol="0" anchor="ctr">
+            <a:normAutofit/>
+          </a:bodyPr>
+          <a:lstStyle/>
+          <a:p>
+            <a:pPr algn="ctr"/>
+            <a:r>
+              <a:rPr lang="en-US" sz="3149" dirty="0"/>
               <a:t>Loading</a:t>
             </a:r>
           </a:p>
@@ -1996,12 +2052,14 @@
           </a:ln>
         </p:spPr>
         <p:txBody>
-          <a:bodyPr wrap="square" rtlCol="0" anchor="ctr"/>
-          <a:lstStyle/>
-          <a:p>
-            <a:pPr algn="ctr"/>
-            <a:r>
-              <a:rPr lang="en-US" sz="1800" dirty="0"/>
+          <a:bodyPr wrap="square" rtlCol="0" anchor="ctr">
+            <a:normAutofit/>
+          </a:bodyPr>
+          <a:lstStyle/>
+          <a:p>
+            <a:pPr algn="ctr"/>
+            <a:r>
+              <a:rPr lang="en-US" sz="3149" dirty="0"/>
               <a:t>Success</a:t>
             </a:r>
           </a:p>
@@ -2031,12 +2089,14 @@
           </a:ln>
         </p:spPr>
         <p:txBody>
-          <a:bodyPr wrap="square" rtlCol="0" anchor="ctr"/>
-          <a:lstStyle/>
-          <a:p>
-            <a:pPr algn="ctr"/>
-            <a:r>
-              <a:rPr lang="en-US" sz="1800" dirty="0"/>
+          <a:bodyPr wrap="square" rtlCol="0" anchor="ctr">
+            <a:normAutofit/>
+          </a:bodyPr>
+          <a:lstStyle/>
+          <a:p>
+            <a:pPr algn="ctr"/>
+            <a:r>
+              <a:rPr lang="en-US" sz="3149" dirty="0"/>
               <a:t>Error</a:t>
             </a:r>
           </a:p>
@@ -2066,12 +2126,14 @@
           </a:ln>
         </p:spPr>
         <p:txBody>
-          <a:bodyPr wrap="square" rtlCol="0" anchor="ctr"/>
-          <a:lstStyle/>
-          <a:p>
-            <a:pPr algn="ctr"/>
-            <a:r>
-              <a:rPr lang="en-US" sz="1800" dirty="0"/>
+          <a:bodyPr wrap="square" rtlCol="0" anchor="ctr">
+            <a:normAutofit/>
+          </a:bodyPr>
+          <a:lstStyle/>
+          <a:p>
+            <a:pPr algn="ctr"/>
+            <a:r>
+              <a:rPr lang="en-US" sz="3149" dirty="0"/>
               <a:t>End</a:t>
             </a:r>
           </a:p>
@@ -2411,12 +2473,14 @@
           </a:ln>
         </p:spPr>
         <p:txBody>
-          <a:bodyPr wrap="square" rtlCol="0" anchor="ctr"/>
-          <a:lstStyle/>
-          <a:p>
-            <a:pPr algn="ctr"/>
-            <a:r>
-              <a:rPr lang="en-US" sz="1800" dirty="0"/>
+          <a:bodyPr wrap="square" rtlCol="0" anchor="ctr">
+            <a:normAutofit/>
+          </a:bodyPr>
+          <a:lstStyle/>
+          <a:p>
+            <a:pPr algn="ctr"/>
+            <a:r>
+              <a:rPr lang="en-US" sz="2204" dirty="0"/>
               <a:t>Presentation</a:t>
             </a:r>
           </a:p>
@@ -2446,12 +2510,14 @@
           </a:ln>
         </p:spPr>
         <p:txBody>
-          <a:bodyPr wrap="square" rtlCol="0" anchor="ctr"/>
-          <a:lstStyle/>
-          <a:p>
-            <a:pPr algn="ctr"/>
-            <a:r>
-              <a:rPr lang="en-US" sz="1800" dirty="0"/>
+          <a:bodyPr wrap="square" rtlCol="0" anchor="ctr">
+            <a:normAutofit/>
+          </a:bodyPr>
+          <a:lstStyle/>
+          <a:p>
+            <a:pPr algn="ctr"/>
+            <a:r>
+              <a:rPr lang="en-US" sz="1574" dirty="0"/>
               <a:t>+String title
 +List~Slide~ slides</a:t>
             </a:r>
@@ -2482,12 +2548,14 @@
           </a:ln>
         </p:spPr>
         <p:txBody>
-          <a:bodyPr wrap="square" rtlCol="0" anchor="ctr"/>
-          <a:lstStyle/>
-          <a:p>
-            <a:pPr algn="ctr"/>
-            <a:r>
-              <a:rPr lang="en-US" sz="1800" dirty="0"/>
+          <a:bodyPr wrap="square" rtlCol="0" anchor="ctr">
+            <a:normAutofit/>
+          </a:bodyPr>
+          <a:lstStyle/>
+          <a:p>
+            <a:pPr algn="ctr"/>
+            <a:r>
+              <a:rPr lang="en-US" sz="1574" dirty="0"/>
               <a:t>+addSlide()
 +save()</a:t>
             </a:r>
@@ -2518,12 +2586,14 @@
           </a:ln>
         </p:spPr>
         <p:txBody>
-          <a:bodyPr wrap="square" rtlCol="0" anchor="ctr"/>
-          <a:lstStyle/>
-          <a:p>
-            <a:pPr algn="ctr"/>
-            <a:r>
-              <a:rPr lang="en-US" sz="1800" dirty="0"/>
+          <a:bodyPr wrap="square" rtlCol="0" anchor="ctr">
+            <a:normAutofit/>
+          </a:bodyPr>
+          <a:lstStyle/>
+          <a:p>
+            <a:pPr algn="ctr"/>
+            <a:r>
+              <a:rPr lang="en-US" sz="2204" dirty="0"/>
               <a:t>Slide</a:t>
             </a:r>
           </a:p>
@@ -2553,12 +2623,14 @@
           </a:ln>
         </p:spPr>
         <p:txBody>
-          <a:bodyPr wrap="square" rtlCol="0" anchor="ctr"/>
-          <a:lstStyle/>
-          <a:p>
-            <a:pPr algn="ctr"/>
-            <a:r>
-              <a:rPr lang="en-US" sz="1800" dirty="0"/>
+          <a:bodyPr wrap="square" rtlCol="0" anchor="ctr">
+            <a:normAutofit/>
+          </a:bodyPr>
+          <a:lstStyle/>
+          <a:p>
+            <a:pPr algn="ctr"/>
+            <a:r>
+              <a:rPr lang="en-US" sz="1369" dirty="0"/>
               <a:t>+String title
 +List~Element~ elements</a:t>
             </a:r>
@@ -2589,12 +2661,14 @@
           </a:ln>
         </p:spPr>
         <p:txBody>
-          <a:bodyPr wrap="square" rtlCol="0" anchor="ctr"/>
-          <a:lstStyle/>
-          <a:p>
-            <a:pPr algn="ctr"/>
-            <a:r>
-              <a:rPr lang="en-US" sz="1800" dirty="0"/>
+          <a:bodyPr wrap="square" rtlCol="0" anchor="ctr">
+            <a:normAutofit/>
+          </a:bodyPr>
+          <a:lstStyle/>
+          <a:p>
+            <a:pPr algn="ctr"/>
+            <a:r>
+              <a:rPr lang="en-US" sz="1574" dirty="0"/>
               <a:t>+addElement()</a:t>
             </a:r>
           </a:p>
@@ -2624,12 +2698,14 @@
           </a:ln>
         </p:spPr>
         <p:txBody>
-          <a:bodyPr wrap="square" rtlCol="0" anchor="ctr"/>
-          <a:lstStyle/>
-          <a:p>
-            <a:pPr algn="ctr"/>
-            <a:r>
-              <a:rPr lang="en-US" sz="1800" dirty="0"/>
+          <a:bodyPr wrap="square" rtlCol="0" anchor="ctr">
+            <a:normAutofit/>
+          </a:bodyPr>
+          <a:lstStyle/>
+          <a:p>
+            <a:pPr algn="ctr"/>
+            <a:r>
+              <a:rPr lang="en-US" sz="2204" dirty="0"/>
               <a:t>Element</a:t>
             </a:r>
           </a:p>
@@ -2659,12 +2735,14 @@
           </a:ln>
         </p:spPr>
         <p:txBody>
-          <a:bodyPr wrap="square" rtlCol="0" anchor="ctr"/>
-          <a:lstStyle/>
-          <a:p>
-            <a:pPr algn="ctr"/>
-            <a:r>
-              <a:rPr lang="en-US" sz="1800" dirty="0"/>
+          <a:bodyPr wrap="square" rtlCol="0" anchor="ctr">
+            <a:normAutofit/>
+          </a:bodyPr>
+          <a:lstStyle/>
+          <a:p>
+            <a:pPr algn="ctr"/>
+            <a:r>
+              <a:rPr lang="en-US" sz="1574" dirty="0"/>
               <a:t>&lt;&lt;interface&gt;&gt;</a:t>
             </a:r>
           </a:p>
@@ -2694,12 +2772,14 @@
           </a:ln>
         </p:spPr>
         <p:txBody>
-          <a:bodyPr wrap="square" rtlCol="0" anchor="ctr"/>
-          <a:lstStyle/>
-          <a:p>
-            <a:pPr algn="ctr"/>
-            <a:r>
-              <a:rPr lang="en-US" sz="1800" dirty="0"/>
+          <a:bodyPr wrap="square" rtlCol="0" anchor="ctr">
+            <a:normAutofit/>
+          </a:bodyPr>
+          <a:lstStyle/>
+          <a:p>
+            <a:pPr algn="ctr"/>
+            <a:r>
+              <a:rPr lang="en-US" sz="1574" dirty="0"/>
               <a:t>+render()</a:t>
             </a:r>
           </a:p>
@@ -2729,12 +2809,14 @@
           </a:ln>
         </p:spPr>
         <p:txBody>
-          <a:bodyPr wrap="square" rtlCol="0" anchor="ctr"/>
-          <a:lstStyle/>
-          <a:p>
-            <a:pPr algn="ctr"/>
-            <a:r>
-              <a:rPr lang="en-US" sz="1800" dirty="0"/>
+          <a:bodyPr wrap="square" rtlCol="0" anchor="ctr">
+            <a:normAutofit/>
+          </a:bodyPr>
+          <a:lstStyle/>
+          <a:p>
+            <a:pPr algn="ctr"/>
+            <a:r>
+              <a:rPr lang="en-US" sz="2204" dirty="0"/>
               <a:t>TextBox</a:t>
             </a:r>
           </a:p>
@@ -2764,12 +2846,14 @@
           </a:ln>
         </p:spPr>
         <p:txBody>
-          <a:bodyPr wrap="square" rtlCol="0" anchor="ctr"/>
-          <a:lstStyle/>
-          <a:p>
-            <a:pPr algn="ctr"/>
-            <a:r>
-              <a:rPr lang="en-US" sz="1800" dirty="0"/>
+          <a:bodyPr wrap="square" rtlCol="0" anchor="ctr">
+            <a:normAutofit/>
+          </a:bodyPr>
+          <a:lstStyle/>
+          <a:p>
+            <a:pPr algn="ctr"/>
+            <a:r>
+              <a:rPr lang="en-US" sz="1574" dirty="0"/>
               <a:t>+String text</a:t>
             </a:r>
           </a:p>
@@ -2799,12 +2883,14 @@
           </a:ln>
         </p:spPr>
         <p:txBody>
-          <a:bodyPr wrap="square" rtlCol="0" anchor="ctr"/>
-          <a:lstStyle/>
-          <a:p>
-            <a:pPr algn="ctr"/>
-            <a:r>
-              <a:rPr lang="en-US" sz="1800" dirty="0"/>
+          <a:bodyPr wrap="square" rtlCol="0" anchor="ctr">
+            <a:normAutofit/>
+          </a:bodyPr>
+          <a:lstStyle/>
+          <a:p>
+            <a:pPr algn="ctr"/>
+            <a:r>
+              <a:rPr lang="en-US" sz="1574" dirty="0"/>
               <a:t>+render()</a:t>
             </a:r>
           </a:p>
@@ -2834,12 +2920,14 @@
           </a:ln>
         </p:spPr>
         <p:txBody>
-          <a:bodyPr wrap="square" rtlCol="0" anchor="ctr"/>
-          <a:lstStyle/>
-          <a:p>
-            <a:pPr algn="ctr"/>
-            <a:r>
-              <a:rPr lang="en-US" sz="1800" dirty="0"/>
+          <a:bodyPr wrap="square" rtlCol="0" anchor="ctr">
+            <a:normAutofit/>
+          </a:bodyPr>
+          <a:lstStyle/>
+          <a:p>
+            <a:pPr algn="ctr"/>
+            <a:r>
+              <a:rPr lang="en-US" sz="2204" dirty="0"/>
               <a:t>Table</a:t>
             </a:r>
           </a:p>
@@ -2869,12 +2957,14 @@
           </a:ln>
         </p:spPr>
         <p:txBody>
-          <a:bodyPr wrap="square" rtlCol="0" anchor="ctr"/>
-          <a:lstStyle/>
-          <a:p>
-            <a:pPr algn="ctr"/>
-            <a:r>
-              <a:rPr lang="en-US" sz="1800" dirty="0"/>
+          <a:bodyPr wrap="square" rtlCol="0" anchor="ctr">
+            <a:normAutofit/>
+          </a:bodyPr>
+          <a:lstStyle/>
+          <a:p>
+            <a:pPr algn="ctr"/>
+            <a:r>
+              <a:rPr lang="en-US" sz="1574" dirty="0"/>
               <a:t>+List~Row~ rows</a:t>
             </a:r>
           </a:p>
@@ -2904,12 +2994,14 @@
           </a:ln>
         </p:spPr>
         <p:txBody>
-          <a:bodyPr wrap="square" rtlCol="0" anchor="ctr"/>
-          <a:lstStyle/>
-          <a:p>
-            <a:pPr algn="ctr"/>
-            <a:r>
-              <a:rPr lang="en-US" sz="1800" dirty="0"/>
+          <a:bodyPr wrap="square" rtlCol="0" anchor="ctr">
+            <a:normAutofit/>
+          </a:bodyPr>
+          <a:lstStyle/>
+          <a:p>
+            <a:pPr algn="ctr"/>
+            <a:r>
+              <a:rPr lang="en-US" sz="1574" dirty="0"/>
               <a:t>+render()</a:t>
             </a:r>
           </a:p>
@@ -3045,12 +3137,14 @@
           </a:ln>
         </p:spPr>
         <p:txBody>
-          <a:bodyPr wrap="square" rtlCol="0" anchor="ctr"/>
-          <a:lstStyle/>
-          <a:p>
-            <a:pPr algn="ctr"/>
-            <a:r>
-              <a:rPr lang="en-US" sz="1800" dirty="0"/>
+          <a:bodyPr wrap="square" rtlCol="0" anchor="ctr">
+            <a:normAutofit/>
+          </a:bodyPr>
+          <a:lstStyle/>
+          <a:p>
+            <a:pPr algn="ctr"/>
+            <a:r>
+              <a:rPr lang="en-US" sz="4400" dirty="0"/>
               <a:t>Diagram: journey</a:t>
             </a:r>
           </a:p>
@@ -3183,12 +3277,14 @@
           </a:prstGeom>
         </p:spPr>
         <p:txBody>
-          <a:bodyPr wrap="square" rtlCol="0" anchor="ctr"/>
-          <a:lstStyle/>
-          <a:p>
-            <a:pPr algn="ctr"/>
-            <a:r>
-              <a:rPr lang="en-US" sz="1800" dirty="0"/>
+          <a:bodyPr wrap="square" rtlCol="0" anchor="ctr">
+            <a:normAutofit/>
+          </a:bodyPr>
+          <a:lstStyle/>
+          <a:p>
+            <a:pPr algn="ctr"/>
+            <a:r>
+              <a:rPr lang="en-US" sz="1259" dirty="0"/>
               <a:t>Our Product (35.0%)</a:t>
             </a:r>
           </a:p>
@@ -3234,12 +3330,14 @@
           </a:prstGeom>
         </p:spPr>
         <p:txBody>
-          <a:bodyPr wrap="square" rtlCol="0" anchor="ctr"/>
-          <a:lstStyle/>
-          <a:p>
-            <a:pPr algn="ctr"/>
-            <a:r>
-              <a:rPr lang="en-US" sz="1800" dirty="0"/>
+          <a:bodyPr wrap="square" rtlCol="0" anchor="ctr">
+            <a:normAutofit/>
+          </a:bodyPr>
+          <a:lstStyle/>
+          <a:p>
+            <a:pPr algn="ctr"/>
+            <a:r>
+              <a:rPr lang="en-US" sz="1259" dirty="0"/>
               <a:t>Competitor A (25.0%)</a:t>
             </a:r>
           </a:p>
@@ -3285,12 +3383,14 @@
           </a:prstGeom>
         </p:spPr>
         <p:txBody>
-          <a:bodyPr wrap="square" rtlCol="0" anchor="ctr"/>
-          <a:lstStyle/>
-          <a:p>
-            <a:pPr algn="ctr"/>
-            <a:r>
-              <a:rPr lang="en-US" sz="1800" dirty="0"/>
+          <a:bodyPr wrap="square" rtlCol="0" anchor="ctr">
+            <a:normAutofit/>
+          </a:bodyPr>
+          <a:lstStyle/>
+          <a:p>
+            <a:pPr algn="ctr"/>
+            <a:r>
+              <a:rPr lang="en-US" sz="1259" dirty="0"/>
               <a:t>Competitor B (20.0%)</a:t>
             </a:r>
           </a:p>
@@ -3336,12 +3436,14 @@
           </a:prstGeom>
         </p:spPr>
         <p:txBody>
-          <a:bodyPr wrap="square" rtlCol="0" anchor="ctr"/>
-          <a:lstStyle/>
-          <a:p>
-            <a:pPr algn="ctr"/>
-            <a:r>
-              <a:rPr lang="en-US" sz="1800" dirty="0"/>
+          <a:bodyPr wrap="square" rtlCol="0" anchor="ctr">
+            <a:normAutofit/>
+          </a:bodyPr>
+          <a:lstStyle/>
+          <a:p>
+            <a:pPr algn="ctr"/>
+            <a:r>
+              <a:rPr lang="en-US" sz="1259" dirty="0"/>
               <a:t>Competitor C (12.0%)</a:t>
             </a:r>
           </a:p>
@@ -3387,12 +3489,14 @@
           </a:prstGeom>
         </p:spPr>
         <p:txBody>
-          <a:bodyPr wrap="square" rtlCol="0" anchor="ctr"/>
-          <a:lstStyle/>
-          <a:p>
-            <a:pPr algn="ctr"/>
-            <a:r>
-              <a:rPr lang="en-US" sz="1800" dirty="0"/>
+          <a:bodyPr wrap="square" rtlCol="0" anchor="ctr">
+            <a:normAutofit/>
+          </a:bodyPr>
+          <a:lstStyle/>
+          <a:p>
+            <a:pPr algn="ctr"/>
+            <a:r>
+              <a:rPr lang="en-US" sz="1259" dirty="0"/>
               <a:t>Others (8.0%)</a:t>
             </a:r>
           </a:p>
@@ -3480,12 +3584,14 @@
           </a:ln>
         </p:spPr>
         <p:txBody>
-          <a:bodyPr wrap="square" rtlCol="0" anchor="ctr"/>
-          <a:lstStyle/>
-          <a:p>
-            <a:pPr algn="ctr"/>
-            <a:r>
-              <a:rPr lang="en-US" sz="1800" dirty="0"/>
+          <a:bodyPr wrap="square" rtlCol="0" anchor="ctr">
+            <a:normAutofit/>
+          </a:bodyPr>
+          <a:lstStyle/>
+          <a:p>
+            <a:pPr algn="ctr"/>
+            <a:r>
+              <a:rPr lang="en-US" sz="4400" dirty="0"/>
               <a:t>Diagram: quadrantChart</a:t>
             </a:r>
           </a:p>
@@ -3573,12 +3679,14 @@
           </a:ln>
         </p:spPr>
         <p:txBody>
-          <a:bodyPr wrap="square" rtlCol="0" anchor="ctr"/>
-          <a:lstStyle/>
-          <a:p>
-            <a:pPr algn="ctr"/>
-            <a:r>
-              <a:rPr lang="en-US" sz="1800" dirty="0"/>
+          <a:bodyPr wrap="square" rtlCol="0" anchor="ctr">
+            <a:normAutofit/>
+          </a:bodyPr>
+          <a:lstStyle/>
+          <a:p>
+            <a:pPr algn="ctr"/>
+            <a:r>
+              <a:rPr lang="en-US" sz="4400" dirty="0"/>
               <a:t>Diagram: gitGraph</a:t>
             </a:r>
           </a:p>
@@ -3666,12 +3774,14 @@
           </a:ln>
         </p:spPr>
         <p:txBody>
-          <a:bodyPr wrap="square" rtlCol="0" anchor="ctr"/>
-          <a:lstStyle/>
-          <a:p>
-            <a:pPr algn="ctr"/>
-            <a:r>
-              <a:rPr lang="en-US" sz="1800" dirty="0"/>
+          <a:bodyPr wrap="square" rtlCol="0" anchor="ctr">
+            <a:normAutofit/>
+          </a:bodyPr>
+          <a:lstStyle/>
+          <a:p>
+            <a:pPr algn="ctr"/>
+            <a:r>
+              <a:rPr lang="en-US" sz="2624" dirty="0"/>
               <a:t>root((MD2PPT</a:t>
             </a:r>
           </a:p>
@@ -3696,12 +3806,14 @@
           </a:solidFill>
         </p:spPr>
         <p:txBody>
-          <a:bodyPr wrap="square" rtlCol="0" anchor="ctr"/>
-          <a:lstStyle/>
-          <a:p>
-            <a:pPr algn="ctr"/>
-            <a:r>
-              <a:rPr lang="en-US" sz="1800" dirty="0"/>
+          <a:bodyPr wrap="square" rtlCol="0" anchor="ctr">
+            <a:normAutofit/>
+          </a:bodyPr>
+          <a:lstStyle/>
+          <a:p>
+            <a:pPr algn="ctr"/>
+            <a:r>
+              <a:rPr lang="en-US" sz="2519" dirty="0"/>
               <a:t>Input</a:t>
             </a:r>
           </a:p>
@@ -3726,12 +3838,14 @@
           </a:solidFill>
         </p:spPr>
         <p:txBody>
-          <a:bodyPr wrap="square" rtlCol="0" anchor="ctr"/>
-          <a:lstStyle/>
-          <a:p>
-            <a:pPr algn="ctr"/>
-            <a:r>
-              <a:rPr lang="en-US" sz="1800" dirty="0"/>
+          <a:bodyPr wrap="square" rtlCol="0" anchor="ctr">
+            <a:normAutofit/>
+          </a:bodyPr>
+          <a:lstStyle/>
+          <a:p>
+            <a:pPr algn="ctr"/>
+            <a:r>
+              <a:rPr lang="en-US" sz="2362" dirty="0"/>
               <a:t>Processing</a:t>
             </a:r>
           </a:p>
@@ -3756,12 +3870,14 @@
           </a:solidFill>
         </p:spPr>
         <p:txBody>
-          <a:bodyPr wrap="square" rtlCol="0" anchor="ctr"/>
-          <a:lstStyle/>
-          <a:p>
-            <a:pPr algn="ctr"/>
-            <a:r>
-              <a:rPr lang="en-US" sz="1800" dirty="0"/>
+          <a:bodyPr wrap="square" rtlCol="0" anchor="ctr">
+            <a:normAutofit/>
+          </a:bodyPr>
+          <a:lstStyle/>
+          <a:p>
+            <a:pPr algn="ctr"/>
+            <a:r>
+              <a:rPr lang="en-US" sz="2519" dirty="0"/>
               <a:t>Output</a:t>
             </a:r>
           </a:p>
@@ -3786,12 +3902,14 @@
           </a:solidFill>
         </p:spPr>
         <p:txBody>
-          <a:bodyPr wrap="square" rtlCol="0" anchor="ctr"/>
-          <a:lstStyle/>
-          <a:p>
-            <a:pPr algn="ctr"/>
-            <a:r>
-              <a:rPr lang="en-US" sz="1800" dirty="0"/>
+          <a:bodyPr wrap="square" rtlCol="0" anchor="ctr">
+            <a:normAutofit/>
+          </a:bodyPr>
+          <a:lstStyle/>
+          <a:p>
+            <a:pPr algn="ctr"/>
+            <a:r>
+              <a:rPr lang="en-US" sz="2519" dirty="0"/>
               <a:t>Features</a:t>
             </a:r>
           </a:p>
@@ -3821,12 +3939,14 @@
           </a:ln>
         </p:spPr>
         <p:txBody>
-          <a:bodyPr wrap="square" rtlCol="0" anchor="ctr"/>
-          <a:lstStyle/>
-          <a:p>
-            <a:pPr algn="ctr"/>
-            <a:r>
-              <a:rPr lang="en-US" sz="1800" dirty="0"/>
+          <a:bodyPr wrap="square" rtlCol="0" anchor="ctr">
+            <a:normAutofit/>
+          </a:bodyPr>
+          <a:lstStyle/>
+          <a:p>
+            <a:pPr algn="ctr"/>
+            <a:r>
+              <a:rPr lang="en-US" sz="1687" dirty="0"/>
               <a:t>Markdown files</a:t>
             </a:r>
           </a:p>
@@ -3856,12 +3976,14 @@
           </a:ln>
         </p:spPr>
         <p:txBody>
-          <a:bodyPr wrap="square" rtlCol="0" anchor="ctr"/>
-          <a:lstStyle/>
-          <a:p>
-            <a:pPr algn="ctr"/>
-            <a:r>
-              <a:rPr lang="en-US" sz="1800" dirty="0"/>
+          <a:bodyPr wrap="square" rtlCol="0" anchor="ctr">
+            <a:normAutofit/>
+          </a:bodyPr>
+          <a:lstStyle/>
+          <a:p>
+            <a:pPr algn="ctr"/>
+            <a:r>
+              <a:rPr lang="en-US" sz="2362" dirty="0"/>
               <a:t>GFM tables</a:t>
             </a:r>
           </a:p>
@@ -3891,12 +4013,14 @@
           </a:ln>
         </p:spPr>
         <p:txBody>
-          <a:bodyPr wrap="square" rtlCol="0" anchor="ctr"/>
-          <a:lstStyle/>
-          <a:p>
-            <a:pPr algn="ctr"/>
-            <a:r>
-              <a:rPr lang="en-US" sz="1800" dirty="0"/>
+          <a:bodyPr wrap="square" rtlCol="0" anchor="ctr">
+            <a:normAutofit/>
+          </a:bodyPr>
+          <a:lstStyle/>
+          <a:p>
+            <a:pPr algn="ctr"/>
+            <a:r>
+              <a:rPr lang="en-US" sz="1476" dirty="0"/>
               <a:t>Mermaid diagrams</a:t>
             </a:r>
           </a:p>
@@ -3926,12 +4050,14 @@
           </a:ln>
         </p:spPr>
         <p:txBody>
-          <a:bodyPr wrap="square" rtlCol="0" anchor="ctr"/>
-          <a:lstStyle/>
-          <a:p>
-            <a:pPr algn="ctr"/>
-            <a:r>
-              <a:rPr lang="en-US" sz="1800" dirty="0"/>
+          <a:bodyPr wrap="square" rtlCol="0" anchor="ctr">
+            <a:normAutofit/>
+          </a:bodyPr>
+          <a:lstStyle/>
+          <a:p>
+            <a:pPr algn="ctr"/>
+            <a:r>
+              <a:rPr lang="en-US" sz="1687" dirty="0"/>
               <a:t>Parse markdown</a:t>
             </a:r>
           </a:p>
@@ -3961,12 +4087,14 @@
           </a:ln>
         </p:spPr>
         <p:txBody>
-          <a:bodyPr wrap="square" rtlCol="0" anchor="ctr"/>
-          <a:lstStyle/>
-          <a:p>
-            <a:pPr algn="ctr"/>
-            <a:r>
-              <a:rPr lang="en-US" sz="1800" dirty="0"/>
+          <a:bodyPr wrap="square" rtlCol="0" anchor="ctr">
+            <a:normAutofit/>
+          </a:bodyPr>
+          <a:lstStyle/>
+          <a:p>
+            <a:pPr algn="ctr"/>
+            <a:r>
+              <a:rPr lang="en-US" sz="1476" dirty="0"/>
               <a:t>Convert elements</a:t>
             </a:r>
           </a:p>
@@ -3996,12 +4124,14 @@
           </a:ln>
         </p:spPr>
         <p:txBody>
-          <a:bodyPr wrap="square" rtlCol="0" anchor="ctr"/>
-          <a:lstStyle/>
-          <a:p>
-            <a:pPr algn="ctr"/>
-            <a:r>
-              <a:rPr lang="en-US" sz="1800" dirty="0"/>
+          <a:bodyPr wrap="square" rtlCol="0" anchor="ctr">
+            <a:normAutofit/>
+          </a:bodyPr>
+          <a:lstStyle/>
+          <a:p>
+            <a:pPr algn="ctr"/>
+            <a:r>
+              <a:rPr lang="en-US" sz="1968" dirty="0"/>
               <a:t>Generate XML</a:t>
             </a:r>
           </a:p>
@@ -4031,12 +4161,14 @@
           </a:ln>
         </p:spPr>
         <p:txBody>
-          <a:bodyPr wrap="square" rtlCol="0" anchor="ctr"/>
-          <a:lstStyle/>
-          <a:p>
-            <a:pPr algn="ctr"/>
-            <a:r>
-              <a:rPr lang="en-US" sz="1800" dirty="0"/>
+          <a:bodyPr wrap="square" rtlCol="0" anchor="ctr">
+            <a:normAutofit/>
+          </a:bodyPr>
+          <a:lstStyle/>
+          <a:p>
+            <a:pPr algn="ctr"/>
+            <a:r>
+              <a:rPr lang="en-US" sz="2362" dirty="0"/>
               <a:t>PPTX files</a:t>
             </a:r>
           </a:p>
@@ -4066,12 +4198,14 @@
           </a:ln>
         </p:spPr>
         <p:txBody>
-          <a:bodyPr wrap="square" rtlCol="0" anchor="ctr"/>
-          <a:lstStyle/>
-          <a:p>
-            <a:pPr algn="ctr"/>
-            <a:r>
-              <a:rPr lang="en-US" sz="1800" dirty="0"/>
+          <a:bodyPr wrap="square" rtlCol="0" anchor="ctr">
+            <a:normAutofit/>
+          </a:bodyPr>
+          <a:lstStyle/>
+          <a:p>
+            <a:pPr algn="ctr"/>
+            <a:r>
+              <a:rPr lang="en-US" sz="1817" dirty="0"/>
               <a:t>Speaker notes</a:t>
             </a:r>
           </a:p>
@@ -4101,12 +4235,14 @@
           </a:ln>
         </p:spPr>
         <p:txBody>
-          <a:bodyPr wrap="square" rtlCol="0" anchor="ctr"/>
-          <a:lstStyle/>
-          <a:p>
-            <a:pPr algn="ctr"/>
-            <a:r>
-              <a:rPr lang="en-US" sz="1800" dirty="0"/>
+          <a:bodyPr wrap="square" rtlCol="0" anchor="ctr">
+            <a:normAutofit/>
+          </a:bodyPr>
+          <a:lstStyle/>
+          <a:p>
+            <a:pPr algn="ctr"/>
+            <a:r>
+              <a:rPr lang="en-US" sz="1687" dirty="0"/>
               <a:t>Styled content</a:t>
             </a:r>
           </a:p>
@@ -4136,12 +4272,14 @@
           </a:ln>
         </p:spPr>
         <p:txBody>
-          <a:bodyPr wrap="square" rtlCol="0" anchor="ctr"/>
-          <a:lstStyle/>
-          <a:p>
-            <a:pPr algn="ctr"/>
-            <a:r>
-              <a:rPr lang="en-US" sz="1800" dirty="0"/>
+          <a:bodyPr wrap="square" rtlCol="0" anchor="ctr">
+            <a:normAutofit/>
+          </a:bodyPr>
+          <a:lstStyle/>
+          <a:p>
+            <a:pPr algn="ctr"/>
+            <a:r>
+              <a:rPr lang="en-US" sz="2519" dirty="0"/>
               <a:t>Tables</a:t>
             </a:r>
           </a:p>
@@ -4171,12 +4309,14 @@
           </a:ln>
         </p:spPr>
         <p:txBody>
-          <a:bodyPr wrap="square" rtlCol="0" anchor="ctr"/>
-          <a:lstStyle/>
-          <a:p>
-            <a:pPr algn="ctr"/>
-            <a:r>
-              <a:rPr lang="en-US" sz="1800" dirty="0"/>
+          <a:bodyPr wrap="square" rtlCol="0" anchor="ctr">
+            <a:normAutofit/>
+          </a:bodyPr>
+          <a:lstStyle/>
+          <a:p>
+            <a:pPr algn="ctr"/>
+            <a:r>
+              <a:rPr lang="en-US" sz="2147" dirty="0"/>
               <a:t>Code blocks</a:t>
             </a:r>
           </a:p>
@@ -4206,12 +4346,14 @@
           </a:ln>
         </p:spPr>
         <p:txBody>
-          <a:bodyPr wrap="square" rtlCol="0" anchor="ctr"/>
-          <a:lstStyle/>
-          <a:p>
-            <a:pPr algn="ctr"/>
-            <a:r>
-              <a:rPr lang="en-US" sz="1800" dirty="0"/>
+          <a:bodyPr wrap="square" rtlCol="0" anchor="ctr">
+            <a:normAutofit/>
+          </a:bodyPr>
+          <a:lstStyle/>
+          <a:p>
+            <a:pPr algn="ctr"/>
+            <a:r>
+              <a:rPr lang="en-US" sz="2519" dirty="0"/>
               <a:t>Diagrams</a:t>
             </a:r>
           </a:p>
@@ -4241,12 +4383,14 @@
           </a:ln>
         </p:spPr>
         <p:txBody>
-          <a:bodyPr wrap="square" rtlCol="0" anchor="ctr"/>
-          <a:lstStyle/>
-          <a:p>
-            <a:pPr algn="ctr"/>
-            <a:r>
-              <a:rPr lang="en-US" sz="1800" dirty="0"/>
+          <a:bodyPr wrap="square" rtlCol="0" anchor="ctr">
+            <a:normAutofit/>
+          </a:bodyPr>
+          <a:lstStyle/>
+          <a:p>
+            <a:pPr algn="ctr"/>
+            <a:r>
+              <a:rPr lang="en-US" sz="2362" dirty="0"/>
               <a:t>Formatting</a:t>
             </a:r>
           </a:p>
@@ -4326,12 +4470,14 @@
           </a:prstGeom>
         </p:spPr>
         <p:txBody>
-          <a:bodyPr wrap="square" rtlCol="0" anchor="ctr"/>
-          <a:lstStyle/>
-          <a:p>
-            <a:pPr algn="ctr"/>
-            <a:r>
-              <a:rPr lang="en-US" sz="1800" dirty="0"/>
+          <a:bodyPr wrap="square" rtlCol="0" anchor="ctr">
+            <a:normAutofit/>
+          </a:bodyPr>
+          <a:lstStyle/>
+          <a:p>
+            <a:pPr algn="ctr"/>
+            <a:r>
+              <a:rPr lang="en-US" sz="2519" dirty="0"/>
               <a:t>MD2PPT Development Timeline</a:t>
             </a:r>
           </a:p>
@@ -4404,12 +4550,14 @@
           </a:solidFill>
         </p:spPr>
         <p:txBody>
-          <a:bodyPr wrap="square" rtlCol="0" anchor="ctr"/>
-          <a:lstStyle/>
-          <a:p>
-            <a:pPr algn="ctr"/>
-            <a:r>
-              <a:rPr lang="en-US" sz="1800" dirty="0"/>
+          <a:bodyPr wrap="square" rtlCol="0" anchor="ctr">
+            <a:normAutofit/>
+          </a:bodyPr>
+          <a:lstStyle/>
+          <a:p>
+            <a:pPr algn="ctr"/>
+            <a:r>
+              <a:rPr lang="en-US" sz="1889" dirty="0"/>
               <a:t>2024-01</a:t>
             </a:r>
           </a:p>
@@ -4439,12 +4587,14 @@
           </a:ln>
         </p:spPr>
         <p:txBody>
-          <a:bodyPr wrap="square" rtlCol="0" anchor="ctr"/>
-          <a:lstStyle/>
-          <a:p>
-            <a:pPr algn="ctr"/>
-            <a:r>
-              <a:rPr lang="en-US" sz="1800" dirty="0"/>
+          <a:bodyPr wrap="square" rtlCol="0" anchor="ctr">
+            <a:normAutofit/>
+          </a:bodyPr>
+          <a:lstStyle/>
+          <a:p>
+            <a:pPr algn="ctr"/>
+            <a:r>
+              <a:rPr lang="en-US" sz="1469" dirty="0"/>
               <a:t>Project started</a:t>
             </a:r>
           </a:p>
@@ -4493,12 +4643,14 @@
           </a:solidFill>
         </p:spPr>
         <p:txBody>
-          <a:bodyPr wrap="square" rtlCol="0" anchor="ctr"/>
-          <a:lstStyle/>
-          <a:p>
-            <a:pPr algn="ctr"/>
-            <a:r>
-              <a:rPr lang="en-US" sz="1800" dirty="0"/>
+          <a:bodyPr wrap="square" rtlCol="0" anchor="ctr">
+            <a:normAutofit/>
+          </a:bodyPr>
+          <a:lstStyle/>
+          <a:p>
+            <a:pPr algn="ctr"/>
+            <a:r>
+              <a:rPr lang="en-US" sz="1889" dirty="0"/>
               <a:t>2024-02</a:t>
             </a:r>
           </a:p>
@@ -4528,12 +4680,14 @@
           </a:ln>
         </p:spPr>
         <p:txBody>
-          <a:bodyPr wrap="square" rtlCol="0" anchor="ctr"/>
-          <a:lstStyle/>
-          <a:p>
-            <a:pPr algn="ctr"/>
-            <a:r>
-              <a:rPr lang="en-US" sz="1800" dirty="0"/>
+          <a:bodyPr wrap="square" rtlCol="0" anchor="ctr">
+            <a:normAutofit/>
+          </a:bodyPr>
+          <a:lstStyle/>
+          <a:p>
+            <a:pPr algn="ctr"/>
+            <a:r>
+              <a:rPr lang="en-US" sz="1002" dirty="0"/>
               <a:t>Core architecture
 Basic markdown parsing</a:t>
             </a:r>
@@ -4583,12 +4737,14 @@
           </a:solidFill>
         </p:spPr>
         <p:txBody>
-          <a:bodyPr wrap="square" rtlCol="0" anchor="ctr"/>
-          <a:lstStyle/>
-          <a:p>
-            <a:pPr algn="ctr"/>
-            <a:r>
-              <a:rPr lang="en-US" sz="1800" dirty="0"/>
+          <a:bodyPr wrap="square" rtlCol="0" anchor="ctr">
+            <a:normAutofit/>
+          </a:bodyPr>
+          <a:lstStyle/>
+          <a:p>
+            <a:pPr algn="ctr"/>
+            <a:r>
+              <a:rPr lang="en-US" sz="1889" dirty="0"/>
               <a:t>2024-03</a:t>
             </a:r>
           </a:p>
@@ -4618,12 +4774,14 @@
           </a:ln>
         </p:spPr>
         <p:txBody>
-          <a:bodyPr wrap="square" rtlCol="0" anchor="ctr"/>
-          <a:lstStyle/>
-          <a:p>
-            <a:pPr algn="ctr"/>
-            <a:r>
-              <a:rPr lang="en-US" sz="1800" dirty="0"/>
+          <a:bodyPr wrap="square" rtlCol="0" anchor="ctr">
+            <a:normAutofit/>
+          </a:bodyPr>
+          <a:lstStyle/>
+          <a:p>
+            <a:pPr algn="ctr"/>
+            <a:r>
+              <a:rPr lang="en-US" sz="1377" dirty="0"/>
               <a:t>Slide generation
 Table support</a:t>
             </a:r>
@@ -4673,12 +4831,14 @@
           </a:solidFill>
         </p:spPr>
         <p:txBody>
-          <a:bodyPr wrap="square" rtlCol="0" anchor="ctr"/>
-          <a:lstStyle/>
-          <a:p>
-            <a:pPr algn="ctr"/>
-            <a:r>
-              <a:rPr lang="en-US" sz="1800" dirty="0"/>
+          <a:bodyPr wrap="square" rtlCol="0" anchor="ctr">
+            <a:normAutofit/>
+          </a:bodyPr>
+          <a:lstStyle/>
+          <a:p>
+            <a:pPr algn="ctr"/>
+            <a:r>
+              <a:rPr lang="en-US" sz="1889" dirty="0"/>
               <a:t>2024-04</a:t>
             </a:r>
           </a:p>
@@ -4708,12 +4868,14 @@
           </a:ln>
         </p:spPr>
         <p:txBody>
-          <a:bodyPr wrap="square" rtlCol="0" anchor="ctr"/>
-          <a:lstStyle/>
-          <a:p>
-            <a:pPr algn="ctr"/>
-            <a:r>
-              <a:rPr lang="en-US" sz="1800" dirty="0"/>
+          <a:bodyPr wrap="square" rtlCol="0" anchor="ctr">
+            <a:normAutofit/>
+          </a:bodyPr>
+          <a:lstStyle/>
+          <a:p>
+            <a:pPr algn="ctr"/>
+            <a:r>
+              <a:rPr lang="en-US" sz="1160" dirty="0"/>
               <a:t>Code blocks
 Mermaid integration</a:t>
             </a:r>
@@ -4763,12 +4925,14 @@
           </a:solidFill>
         </p:spPr>
         <p:txBody>
-          <a:bodyPr wrap="square" rtlCol="0" anchor="ctr"/>
-          <a:lstStyle/>
-          <a:p>
-            <a:pPr algn="ctr"/>
-            <a:r>
-              <a:rPr lang="en-US" sz="1800" dirty="0"/>
+          <a:bodyPr wrap="square" rtlCol="0" anchor="ctr">
+            <a:normAutofit/>
+          </a:bodyPr>
+          <a:lstStyle/>
+          <a:p>
+            <a:pPr algn="ctr"/>
+            <a:r>
+              <a:rPr lang="en-US" sz="1889" dirty="0"/>
               <a:t>2024-05</a:t>
             </a:r>
           </a:p>
@@ -4798,12 +4962,14 @@
           </a:ln>
         </p:spPr>
         <p:txBody>
-          <a:bodyPr wrap="square" rtlCol="0" anchor="ctr"/>
-          <a:lstStyle/>
-          <a:p>
-            <a:pPr algn="ctr"/>
-            <a:r>
-              <a:rPr lang="en-US" sz="1800" dirty="0"/>
+          <a:bodyPr wrap="square" rtlCol="0" anchor="ctr">
+            <a:normAutofit/>
+          </a:bodyPr>
+          <a:lstStyle/>
+          <a:p>
+            <a:pPr algn="ctr"/>
+            <a:r>
+              <a:rPr lang="en-US" sz="1377" dirty="0"/>
               <a:t>Speaker notes
 Testing &amp; polish</a:t>
             </a:r>
@@ -8675,12 +8841,14 @@
           </a:ln>
         </p:spPr>
         <p:txBody>
-          <a:bodyPr wrap="square" rtlCol="0" anchor="ctr"/>
-          <a:lstStyle/>
-          <a:p>
-            <a:pPr algn="ctr"/>
-            <a:r>
-              <a:rPr lang="en-US" sz="1800" dirty="0"/>
+          <a:bodyPr wrap="square" rtlCol="0" anchor="ctr">
+            <a:normAutofit/>
+          </a:bodyPr>
+          <a:lstStyle/>
+          <a:p>
+            <a:pPr algn="ctr"/>
+            <a:r>
+              <a:rPr lang="en-US" sz="4400" dirty="0"/>
               <a:t>Client</a:t>
             </a:r>
           </a:p>
@@ -8710,12 +8878,14 @@
           </a:ln>
         </p:spPr>
         <p:txBody>
-          <a:bodyPr wrap="square" rtlCol="0" anchor="ctr"/>
-          <a:lstStyle/>
-          <a:p>
-            <a:pPr algn="ctr"/>
-            <a:r>
-              <a:rPr lang="en-US" sz="1800" dirty="0"/>
+          <a:bodyPr wrap="square" rtlCol="0" anchor="ctr">
+            <a:normAutofit/>
+          </a:bodyPr>
+          <a:lstStyle/>
+          <a:p>
+            <a:pPr algn="ctr"/>
+            <a:r>
+              <a:rPr lang="en-US" sz="2004" dirty="0"/>
               <a:t>Web Browser</a:t>
             </a:r>
           </a:p>
@@ -8745,12 +8915,14 @@
           </a:ln>
         </p:spPr>
         <p:txBody>
-          <a:bodyPr wrap="square" rtlCol="0" anchor="ctr"/>
-          <a:lstStyle/>
-          <a:p>
-            <a:pPr algn="ctr"/>
-            <a:r>
-              <a:rPr lang="en-US" sz="1800" dirty="0"/>
+          <a:bodyPr wrap="square" rtlCol="0" anchor="ctr">
+            <a:normAutofit/>
+          </a:bodyPr>
+          <a:lstStyle/>
+          <a:p>
+            <a:pPr algn="ctr"/>
+            <a:r>
+              <a:rPr lang="en-US" sz="2204" dirty="0"/>
               <a:t>Mobile App</a:t>
             </a:r>
           </a:p>
@@ -8780,12 +8952,14 @@
           </a:ln>
         </p:spPr>
         <p:txBody>
-          <a:bodyPr wrap="square" rtlCol="0" anchor="ctr"/>
-          <a:lstStyle/>
-          <a:p>
-            <a:pPr algn="ctr"/>
-            <a:r>
-              <a:rPr lang="en-US" sz="1800" dirty="0"/>
+          <a:bodyPr wrap="square" rtlCol="0" anchor="ctr">
+            <a:normAutofit/>
+          </a:bodyPr>
+          <a:lstStyle/>
+          <a:p>
+            <a:pPr algn="ctr"/>
+            <a:r>
+              <a:rPr lang="en-US" sz="4049" dirty="0"/>
               <a:t>Backend</a:t>
             </a:r>
           </a:p>
@@ -8815,12 +8989,14 @@
           </a:ln>
         </p:spPr>
         <p:txBody>
-          <a:bodyPr wrap="square" rtlCol="0" anchor="ctr"/>
-          <a:lstStyle/>
-          <a:p>
-            <a:pPr algn="ctr"/>
-            <a:r>
-              <a:rPr lang="en-US" sz="1800" dirty="0"/>
+          <a:bodyPr wrap="square" rtlCol="0" anchor="ctr">
+            <a:normAutofit/>
+          </a:bodyPr>
+          <a:lstStyle/>
+          <a:p>
+            <a:pPr algn="ctr"/>
+            <a:r>
+              <a:rPr lang="en-US" sz="2004" dirty="0"/>
               <a:t>API Gateway</a:t>
             </a:r>
           </a:p>
@@ -8850,12 +9026,14 @@
           </a:ln>
         </p:spPr>
         <p:txBody>
-          <a:bodyPr wrap="square" rtlCol="0" anchor="ctr"/>
-          <a:lstStyle/>
-          <a:p>
-            <a:pPr algn="ctr"/>
-            <a:r>
-              <a:rPr lang="en-US" sz="1800" dirty="0"/>
+          <a:bodyPr wrap="square" rtlCol="0" anchor="ctr">
+            <a:normAutofit/>
+          </a:bodyPr>
+          <a:lstStyle/>
+          <a:p>
+            <a:pPr algn="ctr"/>
+            <a:r>
+              <a:rPr lang="en-US" sz="1837" dirty="0"/>
               <a:t>Auth Service</a:t>
             </a:r>
           </a:p>
@@ -8885,12 +9063,14 @@
           </a:ln>
         </p:spPr>
         <p:txBody>
-          <a:bodyPr wrap="square" rtlCol="0" anchor="ctr"/>
-          <a:lstStyle/>
-          <a:p>
-            <a:pPr algn="ctr"/>
-            <a:r>
-              <a:rPr lang="en-US" sz="1800" dirty="0"/>
+          <a:bodyPr wrap="square" rtlCol="0" anchor="ctr">
+            <a:normAutofit/>
+          </a:bodyPr>
+          <a:lstStyle/>
+          <a:p>
+            <a:pPr algn="ctr"/>
+            <a:r>
+              <a:rPr lang="en-US" sz="1837" dirty="0"/>
               <a:t>Data Service</a:t>
             </a:r>
           </a:p>
@@ -8920,12 +9100,14 @@
           </a:ln>
         </p:spPr>
         <p:txBody>
-          <a:bodyPr wrap="square" rtlCol="0" anchor="ctr"/>
-          <a:lstStyle/>
-          <a:p>
-            <a:pPr algn="ctr"/>
-            <a:r>
-              <a:rPr lang="en-US" sz="1800" dirty="0"/>
+          <a:bodyPr wrap="square" rtlCol="0" anchor="ctr">
+            <a:normAutofit/>
+          </a:bodyPr>
+          <a:lstStyle/>
+          <a:p>
+            <a:pPr algn="ctr"/>
+            <a:r>
+              <a:rPr lang="en-US" sz="4049" dirty="0"/>
               <a:t>Storage</a:t>
             </a:r>
           </a:p>
@@ -8955,12 +9137,14 @@
           </a:ln>
         </p:spPr>
         <p:txBody>
-          <a:bodyPr wrap="square" rtlCol="0" anchor="ctr"/>
-          <a:lstStyle/>
-          <a:p>
-            <a:pPr algn="ctr"/>
-            <a:r>
-              <a:rPr lang="en-US" sz="1800" dirty="0"/>
+          <a:bodyPr wrap="square" rtlCol="0" anchor="ctr">
+            <a:normAutofit/>
+          </a:bodyPr>
+          <a:lstStyle/>
+          <a:p>
+            <a:pPr algn="ctr"/>
+            <a:r>
+              <a:rPr lang="en-US" sz="1837" dirty="0"/>
               <a:t>(PostgreSQL)</a:t>
             </a:r>
           </a:p>
@@ -8990,12 +9174,14 @@
           </a:ln>
         </p:spPr>
         <p:txBody>
-          <a:bodyPr wrap="square" rtlCol="0" anchor="ctr"/>
-          <a:lstStyle/>
-          <a:p>
-            <a:pPr algn="ctr"/>
-            <a:r>
-              <a:rPr lang="en-US" sz="1800" dirty="0"/>
+          <a:bodyPr wrap="square" rtlCol="0" anchor="ctr">
+            <a:normAutofit/>
+          </a:bodyPr>
+          <a:lstStyle/>
+          <a:p>
+            <a:pPr algn="ctr"/>
+            <a:r>
+              <a:rPr lang="en-US" sz="1695" dirty="0"/>
               <a:t>(Redis Cache)</a:t>
             </a:r>
           </a:p>
@@ -9251,12 +9437,14 @@
           </a:ln>
         </p:spPr>
         <p:txBody>
-          <a:bodyPr wrap="square" rtlCol="0" anchor="ctr"/>
-          <a:lstStyle/>
-          <a:p>
-            <a:pPr algn="ctr"/>
-            <a:r>
-              <a:rPr lang="en-US" sz="1800" dirty="0"/>
+          <a:bodyPr wrap="square" rtlCol="0" anchor="ctr">
+            <a:normAutofit/>
+          </a:bodyPr>
+          <a:lstStyle/>
+          <a:p>
+            <a:pPr algn="ctr"/>
+            <a:r>
+              <a:rPr lang="en-US" sz="2519" dirty="0"/>
               <a:t>User</a:t>
             </a:r>
           </a:p>
@@ -9310,12 +9498,14 @@
           </a:ln>
         </p:spPr>
         <p:txBody>
-          <a:bodyPr wrap="square" rtlCol="0" anchor="ctr"/>
-          <a:lstStyle/>
-          <a:p>
-            <a:pPr algn="ctr"/>
-            <a:r>
-              <a:rPr lang="en-US" sz="1800" dirty="0"/>
+          <a:bodyPr wrap="square" rtlCol="0" anchor="ctr">
+            <a:normAutofit/>
+          </a:bodyPr>
+          <a:lstStyle/>
+          <a:p>
+            <a:pPr algn="ctr"/>
+            <a:r>
+              <a:rPr lang="en-US" sz="2519" dirty="0"/>
               <a:t>User</a:t>
             </a:r>
           </a:p>
@@ -9345,12 +9535,14 @@
           </a:ln>
         </p:spPr>
         <p:txBody>
-          <a:bodyPr wrap="square" rtlCol="0" anchor="ctr"/>
-          <a:lstStyle/>
-          <a:p>
-            <a:pPr algn="ctr"/>
-            <a:r>
-              <a:rPr lang="en-US" sz="1800" dirty="0"/>
+          <a:bodyPr wrap="square" rtlCol="0" anchor="ctr">
+            <a:normAutofit/>
+          </a:bodyPr>
+          <a:lstStyle/>
+          <a:p>
+            <a:pPr algn="ctr"/>
+            <a:r>
+              <a:rPr lang="en-US" sz="2519" dirty="0"/>
               <a:t>Client</a:t>
             </a:r>
           </a:p>
@@ -9404,12 +9596,14 @@
           </a:ln>
         </p:spPr>
         <p:txBody>
-          <a:bodyPr wrap="square" rtlCol="0" anchor="ctr"/>
-          <a:lstStyle/>
-          <a:p>
-            <a:pPr algn="ctr"/>
-            <a:r>
-              <a:rPr lang="en-US" sz="1800" dirty="0"/>
+          <a:bodyPr wrap="square" rtlCol="0" anchor="ctr">
+            <a:normAutofit/>
+          </a:bodyPr>
+          <a:lstStyle/>
+          <a:p>
+            <a:pPr algn="ctr"/>
+            <a:r>
+              <a:rPr lang="en-US" sz="2519" dirty="0"/>
               <a:t>Client</a:t>
             </a:r>
           </a:p>
@@ -9439,12 +9633,14 @@
           </a:ln>
         </p:spPr>
         <p:txBody>
-          <a:bodyPr wrap="square" rtlCol="0" anchor="ctr"/>
-          <a:lstStyle/>
-          <a:p>
-            <a:pPr algn="ctr"/>
-            <a:r>
-              <a:rPr lang="en-US" sz="1800" dirty="0"/>
+          <a:bodyPr wrap="square" rtlCol="0" anchor="ctr">
+            <a:normAutofit/>
+          </a:bodyPr>
+          <a:lstStyle/>
+          <a:p>
+            <a:pPr algn="ctr"/>
+            <a:r>
+              <a:rPr lang="en-US" sz="2004" dirty="0"/>
               <a:t>Auth Server</a:t>
             </a:r>
           </a:p>
@@ -9498,12 +9694,14 @@
           </a:ln>
         </p:spPr>
         <p:txBody>
-          <a:bodyPr wrap="square" rtlCol="0" anchor="ctr"/>
-          <a:lstStyle/>
-          <a:p>
-            <a:pPr algn="ctr"/>
-            <a:r>
-              <a:rPr lang="en-US" sz="1800" dirty="0"/>
+          <a:bodyPr wrap="square" rtlCol="0" anchor="ctr">
+            <a:normAutofit/>
+          </a:bodyPr>
+          <a:lstStyle/>
+          <a:p>
+            <a:pPr algn="ctr"/>
+            <a:r>
+              <a:rPr lang="en-US" sz="2004" dirty="0"/>
               <a:t>Auth Server</a:t>
             </a:r>
           </a:p>
@@ -9533,12 +9731,14 @@
           </a:ln>
         </p:spPr>
         <p:txBody>
-          <a:bodyPr wrap="square" rtlCol="0" anchor="ctr"/>
-          <a:lstStyle/>
-          <a:p>
-            <a:pPr algn="ctr"/>
-            <a:r>
-              <a:rPr lang="en-US" sz="1800" dirty="0"/>
+          <a:bodyPr wrap="square" rtlCol="0" anchor="ctr">
+            <a:normAutofit/>
+          </a:bodyPr>
+          <a:lstStyle/>
+          <a:p>
+            <a:pPr algn="ctr"/>
+            <a:r>
+              <a:rPr lang="en-US" sz="2519" dirty="0"/>
               <a:t>Database</a:t>
             </a:r>
           </a:p>
@@ -9592,12 +9792,14 @@
           </a:ln>
         </p:spPr>
         <p:txBody>
-          <a:bodyPr wrap="square" rtlCol="0" anchor="ctr"/>
-          <a:lstStyle/>
-          <a:p>
-            <a:pPr algn="ctr"/>
-            <a:r>
-              <a:rPr lang="en-US" sz="1800" dirty="0"/>
+          <a:bodyPr wrap="square" rtlCol="0" anchor="ctr">
+            <a:normAutofit/>
+          </a:bodyPr>
+          <a:lstStyle/>
+          <a:p>
+            <a:pPr algn="ctr"/>
+            <a:r>
+              <a:rPr lang="en-US" sz="2519" dirty="0"/>
               <a:t>Database</a:t>
             </a:r>
           </a:p>
@@ -9643,12 +9845,14 @@
           </a:prstGeom>
         </p:spPr>
         <p:txBody>
-          <a:bodyPr wrap="square" rtlCol="0" anchor="ctr"/>
-          <a:lstStyle/>
-          <a:p>
-            <a:pPr algn="ctr"/>
-            <a:r>
-              <a:rPr lang="en-US" sz="1800" dirty="0"/>
+          <a:bodyPr wrap="square" rtlCol="0" anchor="ctr">
+            <a:normAutofit/>
+          </a:bodyPr>
+          <a:lstStyle/>
+          <a:p>
+            <a:pPr algn="ctr"/>
+            <a:r>
+              <a:rPr lang="en-US" sz="1007" dirty="0"/>
               <a:t>Enter credentials</a:t>
             </a:r>
           </a:p>
@@ -9694,12 +9898,14 @@
           </a:prstGeom>
         </p:spPr>
         <p:txBody>
-          <a:bodyPr wrap="square" rtlCol="0" anchor="ctr"/>
-          <a:lstStyle/>
-          <a:p>
-            <a:pPr algn="ctr"/>
-            <a:r>
-              <a:rPr lang="en-US" sz="1800" dirty="0"/>
+          <a:bodyPr wrap="square" rtlCol="0" anchor="ctr">
+            <a:normAutofit/>
+          </a:bodyPr>
+          <a:lstStyle/>
+          <a:p>
+            <a:pPr algn="ctr"/>
+            <a:r>
+              <a:rPr lang="en-US" sz="1007" dirty="0"/>
               <a:t>POST /login</a:t>
             </a:r>
           </a:p>
@@ -9745,12 +9951,14 @@
           </a:prstGeom>
         </p:spPr>
         <p:txBody>
-          <a:bodyPr wrap="square" rtlCol="0" anchor="ctr"/>
-          <a:lstStyle/>
-          <a:p>
-            <a:pPr algn="ctr"/>
-            <a:r>
-              <a:rPr lang="en-US" sz="1800" dirty="0"/>
+          <a:bodyPr wrap="square" rtlCol="0" anchor="ctr">
+            <a:normAutofit/>
+          </a:bodyPr>
+          <a:lstStyle/>
+          <a:p>
+            <a:pPr algn="ctr"/>
+            <a:r>
+              <a:rPr lang="en-US" sz="1007" dirty="0"/>
               <a:t>Validate user</a:t>
             </a:r>
           </a:p>
@@ -9796,12 +10004,14 @@
           </a:prstGeom>
         </p:spPr>
         <p:txBody>
-          <a:bodyPr wrap="square" rtlCol="0" anchor="ctr"/>
-          <a:lstStyle/>
-          <a:p>
-            <a:pPr algn="ctr"/>
-            <a:r>
-              <a:rPr lang="en-US" sz="1800" dirty="0"/>
+          <a:bodyPr wrap="square" rtlCol="0" anchor="ctr">
+            <a:normAutofit/>
+          </a:bodyPr>
+          <a:lstStyle/>
+          <a:p>
+            <a:pPr algn="ctr"/>
+            <a:r>
+              <a:rPr lang="en-US" sz="1007" dirty="0"/>
               <a:t>User data</a:t>
             </a:r>
           </a:p>
@@ -9847,12 +10057,14 @@
           </a:prstGeom>
         </p:spPr>
         <p:txBody>
-          <a:bodyPr wrap="square" rtlCol="0" anchor="ctr"/>
-          <a:lstStyle/>
-          <a:p>
-            <a:pPr algn="ctr"/>
-            <a:r>
-              <a:rPr lang="en-US" sz="1800" dirty="0"/>
+          <a:bodyPr wrap="square" rtlCol="0" anchor="ctr">
+            <a:normAutofit/>
+          </a:bodyPr>
+          <a:lstStyle/>
+          <a:p>
+            <a:pPr algn="ctr"/>
+            <a:r>
+              <a:rPr lang="en-US" sz="1007" dirty="0"/>
               <a:t>JWT Token</a:t>
             </a:r>
           </a:p>
@@ -9898,12 +10110,14 @@
           </a:prstGeom>
         </p:spPr>
         <p:txBody>
-          <a:bodyPr wrap="square" rtlCol="0" anchor="ctr"/>
-          <a:lstStyle/>
-          <a:p>
-            <a:pPr algn="ctr"/>
-            <a:r>
-              <a:rPr lang="en-US" sz="1800" dirty="0"/>
+          <a:bodyPr wrap="square" rtlCol="0" anchor="ctr">
+            <a:normAutofit/>
+          </a:bodyPr>
+          <a:lstStyle/>
+          <a:p>
+            <a:pPr algn="ctr"/>
+            <a:r>
+              <a:rPr lang="en-US" sz="1007" dirty="0"/>
               <a:t>Login success</a:t>
             </a:r>
           </a:p>

</xml_diff>

<commit_message>
Add 3 new Mermaid diagram types (Journey, Quadrant, GitGraph) with shape-based rendering
- Add `MermaidType::Journey`, `MermaidType::Quadrant`, `MermaidType::GitGraph` enum variants
- Create `journey.rs` for user journey diagrams with sections and scored tasks
- Create `quadrant.rs` for quadrant charts with 4 colored quadrants and data points
- Create `gitgraph.rs` for git commit graphs with branches and merges
- Add detection logic for `journey`, `quadrantChart`/`quadrant`, `gitGraph`/`git` keywords
</commit_message>
<xml_diff>
--- a/examples/md2ppt_demo.pptx
+++ b/examples/md2ppt_demo.pptx
@@ -1443,7 +1443,7 @@
                   <a:srgbClr val="FFFFFF"/>
                 </a:solidFill>
               </a:rPr>
-              <a:t>ORDER</a:t>
+              <a:t>rdered in"</a:t>
             </a:r>
           </a:p>
         </p:txBody>
@@ -1457,7 +1457,7 @@
         <p:spPr>
           <a:xfrm>
             <a:off x="500000" y="2000000"/>
-            <a:ext cx="2200000" cy="1120000"/>
+            <a:ext cx="2200000" cy="280000"/>
           </a:xfrm>
           <a:prstGeom prst="rect">
             <a:avLst/>
@@ -1484,10 +1484,7 @@
                   <a:srgbClr val="000000"/>
                 </a:solidFill>
               </a:rPr>
-              <a:t>int id PK
-int user_id FK
-date order_date
-decimal total</a:t>
+              <a:t/>
             </a:r>
           </a:p>
         </p:txBody>
@@ -1528,7 +1525,7 @@
                   <a:srgbClr val="FFFFFF"/>
                 </a:solidFill>
               </a:rPr>
-              <a:t>PRODUCT</a:t>
+              <a:t>USER</a:t>
             </a:r>
           </a:p>
         </p:txBody>
@@ -1571,8 +1568,8 @@
               </a:rPr>
               <a:t>int id PK
 string name
-decimal price
-int stock</a:t>
+string email
+date created_at</a:t>
             </a:r>
           </a:p>
         </p:txBody>
@@ -1613,7 +1610,7 @@
                   <a:srgbClr val="FFFFFF"/>
                 </a:solidFill>
               </a:rPr>
-              <a:t>rdered in"</a:t>
+              <a:t>ORDER</a:t>
             </a:r>
           </a:p>
         </p:txBody>
@@ -1627,7 +1624,7 @@
         <p:spPr>
           <a:xfrm>
             <a:off x="6100000" y="2000000"/>
-            <a:ext cx="2200000" cy="280000"/>
+            <a:ext cx="2200000" cy="1120000"/>
           </a:xfrm>
           <a:prstGeom prst="rect">
             <a:avLst/>
@@ -1654,7 +1651,10 @@
                   <a:srgbClr val="000000"/>
                 </a:solidFill>
               </a:rPr>
-              <a:t/>
+              <a:t>int id PK
+int user_id FK
+date order_date
+decimal total</a:t>
             </a:r>
           </a:p>
         </p:txBody>
@@ -1695,7 +1695,7 @@
                   <a:srgbClr val="FFFFFF"/>
                 </a:solidFill>
               </a:rPr>
-              <a:t>LINE_ITEM</a:t>
+              <a:t>ntains</a:t>
             </a:r>
           </a:p>
         </p:txBody>
@@ -1709,7 +1709,7 @@
         <p:spPr>
           <a:xfrm>
             <a:off x="500000" y="4500000"/>
-            <a:ext cx="2200000" cy="1120000"/>
+            <a:ext cx="2200000" cy="280000"/>
           </a:xfrm>
           <a:prstGeom prst="rect">
             <a:avLst/>
@@ -1736,10 +1736,7 @@
                   <a:srgbClr val="000000"/>
                 </a:solidFill>
               </a:rPr>
-              <a:t>int id PK
-int order_id FK
-int product_id FK
-int quantity</a:t>
+              <a:t/>
             </a:r>
           </a:p>
         </p:txBody>
@@ -1780,7 +1777,7 @@
                   <a:srgbClr val="FFFFFF"/>
                 </a:solidFill>
               </a:rPr>
-              <a:t>USER</a:t>
+              <a:t>PRODUCT</a:t>
             </a:r>
           </a:p>
         </p:txBody>
@@ -1823,8 +1820,8 @@
               </a:rPr>
               <a:t>int id PK
 string name
-string email
-date created_at</a:t>
+decimal price
+int stock</a:t>
             </a:r>
           </a:p>
         </p:txBody>
@@ -1865,7 +1862,7 @@
                   <a:srgbClr val="FFFFFF"/>
                 </a:solidFill>
               </a:rPr>
-              <a:t>ntains</a:t>
+              <a:t>LINE_ITEM</a:t>
             </a:r>
           </a:p>
         </p:txBody>
@@ -1879,7 +1876,7 @@
         <p:spPr>
           <a:xfrm>
             <a:off x="6100000" y="4500000"/>
-            <a:ext cx="2200000" cy="280000"/>
+            <a:ext cx="2200000" cy="1120000"/>
           </a:xfrm>
           <a:prstGeom prst="rect">
             <a:avLst/>
@@ -1906,7 +1903,10 @@
                   <a:srgbClr val="000000"/>
                 </a:solidFill>
               </a:rPr>
-              <a:t/>
+              <a:t>int id PK
+int order_id FK
+int product_id FK
+int quantity</a:t>
             </a:r>
           </a:p>
         </p:txBody>
@@ -1919,9 +1919,9 @@
           <p:nvPr/>
         </p:nvCxnSpPr>
         <p:spPr>
-          <a:xfrm>
-            <a:off x="2700000" y="1800000"/>
-            <a:ext cx="3400000" cy="2500000"/>
+          <a:xfrm flipH="1">
+            <a:off x="500000" y="1800000"/>
+            <a:ext cx="7800000" cy="2500000"/>
           </a:xfrm>
           <a:prstGeom prst="bentConnector3">
             <a:avLst/>
@@ -1943,9 +1943,9 @@
           <p:nvPr/>
         </p:nvCxnSpPr>
         <p:spPr>
-          <a:xfrm>
-            <a:off x="5500000" y="1800000"/>
-            <a:ext cx="600000" cy="0"/>
+          <a:xfrm flipH="1" flipV="1">
+            <a:off x="500000" y="1800000"/>
+            <a:ext cx="5000000" cy="2500000"/>
           </a:xfrm>
           <a:prstGeom prst="bentConnector3">
             <a:avLst/>
@@ -3305,18 +3305,54 @@
         </p:nvSpPr>
         <p:spPr>
           <a:xfrm>
-            <a:off x="1000000" y="2000000"/>
-            <a:ext cx="7000000" cy="3000000"/>
-          </a:xfrm>
-          <a:prstGeom prst="rect">
-            <a:avLst/>
-          </a:prstGeom>
-          <a:solidFill>
-            <a:srgbClr val="F5F5F5"/>
-          </a:solidFill>
-          <a:ln w="1">
+            <a:off x="500000" y="1800000"/>
+            <a:ext cx="2000000" cy="350000"/>
+          </a:xfrm>
+          <a:prstGeom prst="rect">
+            <a:avLst/>
+          </a:prstGeom>
+          <a:solidFill>
+            <a:srgbClr val="7B1FA2"/>
+          </a:solidFill>
+        </p:spPr>
+        <p:txBody>
+          <a:bodyPr wrap="square" rtlCol="0" anchor="ctr">
+            <a:normAutofit/>
+          </a:bodyPr>
+          <a:lstStyle/>
+          <a:p>
+            <a:pPr algn="ctr"/>
+            <a:r>
+              <a:rPr lang="en-US" sz="2204" dirty="0">
+                <a:solidFill>
+                  <a:srgbClr val="FFFFFF"/>
+                </a:solidFill>
+              </a:rPr>
+              <a:t>Discovery</a:t>
+            </a:r>
+          </a:p>
+        </p:txBody>
+      </p:sp>
+      <p:sp>
+        <p:nvSpPr>
+          <p:cNvPr id="11" name="Shape 11"/>
+          <p:cNvSpPr/>
+          <p:nvPr/>
+        </p:nvSpPr>
+        <p:spPr>
+          <a:xfrm>
+            <a:off x="550000" y="2200000"/>
+            <a:ext cx="1900000" cy="350000"/>
+          </a:xfrm>
+          <a:prstGeom prst="roundRect">
+            <a:avLst/>
+          </a:prstGeom>
+          <a:solidFill>
+            <a:srgbClr val="A5D6A7"/>
+          </a:solidFill>
+          <a:ln w="12700">
             <a:solidFill>
-              <a:srgbClr val="757575"/>
+              <a:srgbClr val="9E9E9E"/>
             </a:solidFill>
           </a:ln>
         </p:spPr>
@@ -3328,12 +3364,412 @@
           <a:p>
             <a:pPr algn="ctr"/>
             <a:r>
-              <a:rPr lang="en-US" sz="4400" dirty="0">
+              <a:rPr lang="en-US" sz="1760" dirty="0">
                 <a:solidFill>
                   <a:srgbClr val="000000"/>
                 </a:solidFill>
               </a:rPr>
-              <a:t>Diagram: journey</a:t>
+              <a:t>Visit website (5)</a:t>
+            </a:r>
+          </a:p>
+        </p:txBody>
+      </p:sp>
+      <p:sp>
+        <p:nvSpPr>
+          <p:cNvPr id="12" name="Shape 12"/>
+          <p:cNvSpPr/>
+          <p:nvPr/>
+        </p:nvSpPr>
+        <p:spPr>
+          <a:xfrm>
+            <a:off x="550000" y="2600000"/>
+            <a:ext cx="1900000" cy="350000"/>
+          </a:xfrm>
+          <a:prstGeom prst="roundRect">
+            <a:avLst/>
+          </a:prstGeom>
+          <a:solidFill>
+            <a:srgbClr val="C8E6C9"/>
+          </a:solidFill>
+          <a:ln w="12700">
+            <a:solidFill>
+              <a:srgbClr val="9E9E9E"/>
+            </a:solidFill>
+          </a:ln>
+        </p:spPr>
+        <p:txBody>
+          <a:bodyPr wrap="square" rtlCol="0" anchor="ctr">
+            <a:normAutofit/>
+          </a:bodyPr>
+          <a:lstStyle/>
+          <a:p>
+            <a:pPr algn="ctr"/>
+            <a:r>
+              <a:rPr lang="en-US" sz="1760" dirty="0">
+                <a:solidFill>
+                  <a:srgbClr val="000000"/>
+                </a:solidFill>
+              </a:rPr>
+              <a:t>Read features (4)</a:t>
+            </a:r>
+          </a:p>
+        </p:txBody>
+      </p:sp>
+      <p:sp>
+        <p:nvSpPr>
+          <p:cNvPr id="13" name="Shape 13"/>
+          <p:cNvSpPr/>
+          <p:nvPr/>
+        </p:nvSpPr>
+        <p:spPr>
+          <a:xfrm>
+            <a:off x="550000" y="3000000"/>
+            <a:ext cx="1900000" cy="350000"/>
+          </a:xfrm>
+          <a:prstGeom prst="roundRect">
+            <a:avLst/>
+          </a:prstGeom>
+          <a:solidFill>
+            <a:srgbClr val="A5D6A7"/>
+          </a:solidFill>
+          <a:ln w="12700">
+            <a:solidFill>
+              <a:srgbClr val="9E9E9E"/>
+            </a:solidFill>
+          </a:ln>
+        </p:spPr>
+        <p:txBody>
+          <a:bodyPr wrap="square" rtlCol="0" anchor="ctr">
+            <a:normAutofit/>
+          </a:bodyPr>
+          <a:lstStyle/>
+          <a:p>
+            <a:pPr algn="ctr"/>
+            <a:r>
+              <a:rPr lang="en-US" sz="2137" dirty="0">
+                <a:solidFill>
+                  <a:srgbClr val="000000"/>
+                </a:solidFill>
+              </a:rPr>
+              <a:t>Watch demo (5)</a:t>
+            </a:r>
+          </a:p>
+        </p:txBody>
+      </p:sp>
+      <p:sp>
+        <p:nvSpPr>
+          <p:cNvPr id="14" name="Shape 14"/>
+          <p:cNvSpPr/>
+          <p:nvPr/>
+        </p:nvSpPr>
+        <p:spPr>
+          <a:xfrm>
+            <a:off x="2700000" y="1800000"/>
+            <a:ext cx="2000000" cy="350000"/>
+          </a:xfrm>
+          <a:prstGeom prst="rect">
+            <a:avLst/>
+          </a:prstGeom>
+          <a:solidFill>
+            <a:srgbClr val="7B1FA2"/>
+          </a:solidFill>
+        </p:spPr>
+        <p:txBody>
+          <a:bodyPr wrap="square" rtlCol="0" anchor="ctr">
+            <a:normAutofit/>
+          </a:bodyPr>
+          <a:lstStyle/>
+          <a:p>
+            <a:pPr algn="ctr"/>
+            <a:r>
+              <a:rPr lang="en-US" sz="2204" dirty="0">
+                <a:solidFill>
+                  <a:srgbClr val="FFFFFF"/>
+                </a:solidFill>
+              </a:rPr>
+              <a:t>Signup</a:t>
+            </a:r>
+          </a:p>
+        </p:txBody>
+      </p:sp>
+      <p:sp>
+        <p:nvSpPr>
+          <p:cNvPr id="15" name="Shape 15"/>
+          <p:cNvSpPr/>
+          <p:nvPr/>
+        </p:nvSpPr>
+        <p:spPr>
+          <a:xfrm>
+            <a:off x="2750000" y="2200000"/>
+            <a:ext cx="1900000" cy="350000"/>
+          </a:xfrm>
+          <a:prstGeom prst="roundRect">
+            <a:avLst/>
+          </a:prstGeom>
+          <a:solidFill>
+            <a:srgbClr val="FFF9C4"/>
+          </a:solidFill>
+          <a:ln w="12700">
+            <a:solidFill>
+              <a:srgbClr val="9E9E9E"/>
+            </a:solidFill>
+          </a:ln>
+        </p:spPr>
+        <p:txBody>
+          <a:bodyPr wrap="square" rtlCol="0" anchor="ctr">
+            <a:normAutofit/>
+          </a:bodyPr>
+          <a:lstStyle/>
+          <a:p>
+            <a:pPr algn="ctr"/>
+            <a:r>
+              <a:rPr lang="en-US" sz="1662" dirty="0">
+                <a:solidFill>
+                  <a:srgbClr val="000000"/>
+                </a:solidFill>
+              </a:rPr>
+              <a:t>Create account (3)</a:t>
+            </a:r>
+          </a:p>
+        </p:txBody>
+      </p:sp>
+      <p:sp>
+        <p:nvSpPr>
+          <p:cNvPr id="16" name="Shape 16"/>
+          <p:cNvSpPr/>
+          <p:nvPr/>
+        </p:nvSpPr>
+        <p:spPr>
+          <a:xfrm>
+            <a:off x="2750000" y="2600000"/>
+            <a:ext cx="1900000" cy="350000"/>
+          </a:xfrm>
+          <a:prstGeom prst="roundRect">
+            <a:avLst/>
+          </a:prstGeom>
+          <a:solidFill>
+            <a:srgbClr val="FFE0B2"/>
+          </a:solidFill>
+          <a:ln w="12700">
+            <a:solidFill>
+              <a:srgbClr val="9E9E9E"/>
+            </a:solidFill>
+          </a:ln>
+        </p:spPr>
+        <p:txBody>
+          <a:bodyPr wrap="square" rtlCol="0" anchor="ctr">
+            <a:normAutofit/>
+          </a:bodyPr>
+          <a:lstStyle/>
+          <a:p>
+            <a:pPr algn="ctr"/>
+            <a:r>
+              <a:rPr lang="en-US" sz="1870" dirty="0">
+                <a:solidFill>
+                  <a:srgbClr val="000000"/>
+                </a:solidFill>
+              </a:rPr>
+              <a:t>Verify email (2)</a:t>
+            </a:r>
+          </a:p>
+        </p:txBody>
+      </p:sp>
+      <p:sp>
+        <p:nvSpPr>
+          <p:cNvPr id="17" name="Shape 17"/>
+          <p:cNvSpPr/>
+          <p:nvPr/>
+        </p:nvSpPr>
+        <p:spPr>
+          <a:xfrm>
+            <a:off x="2750000" y="3000000"/>
+            <a:ext cx="1900000" cy="350000"/>
+          </a:xfrm>
+          <a:prstGeom prst="roundRect">
+            <a:avLst/>
+          </a:prstGeom>
+          <a:solidFill>
+            <a:srgbClr val="FFF9C4"/>
+          </a:solidFill>
+          <a:ln w="12700">
+            <a:solidFill>
+              <a:srgbClr val="9E9E9E"/>
+            </a:solidFill>
+          </a:ln>
+        </p:spPr>
+        <p:txBody>
+          <a:bodyPr wrap="square" rtlCol="0" anchor="ctr">
+            <a:normAutofit/>
+          </a:bodyPr>
+          <a:lstStyle/>
+          <a:p>
+            <a:pPr algn="ctr"/>
+            <a:r>
+              <a:rPr lang="en-US" sz="1496" dirty="0">
+                <a:solidFill>
+                  <a:srgbClr val="000000"/>
+                </a:solidFill>
+              </a:rPr>
+              <a:t>Complete profile (3)</a:t>
+            </a:r>
+          </a:p>
+        </p:txBody>
+      </p:sp>
+      <p:sp>
+        <p:nvSpPr>
+          <p:cNvPr id="18" name="Shape 18"/>
+          <p:cNvSpPr/>
+          <p:nvPr/>
+        </p:nvSpPr>
+        <p:spPr>
+          <a:xfrm>
+            <a:off x="4900000" y="1800000"/>
+            <a:ext cx="2000000" cy="350000"/>
+          </a:xfrm>
+          <a:prstGeom prst="rect">
+            <a:avLst/>
+          </a:prstGeom>
+          <a:solidFill>
+            <a:srgbClr val="7B1FA2"/>
+          </a:solidFill>
+        </p:spPr>
+        <p:txBody>
+          <a:bodyPr wrap="square" rtlCol="0" anchor="ctr">
+            <a:normAutofit/>
+          </a:bodyPr>
+          <a:lstStyle/>
+          <a:p>
+            <a:pPr algn="ctr"/>
+            <a:r>
+              <a:rPr lang="en-US" sz="2204" dirty="0">
+                <a:solidFill>
+                  <a:srgbClr val="FFFFFF"/>
+                </a:solidFill>
+              </a:rPr>
+              <a:t>First Use</a:t>
+            </a:r>
+          </a:p>
+        </p:txBody>
+      </p:sp>
+      <p:sp>
+        <p:nvSpPr>
+          <p:cNvPr id="19" name="Shape 19"/>
+          <p:cNvSpPr/>
+          <p:nvPr/>
+        </p:nvSpPr>
+        <p:spPr>
+          <a:xfrm>
+            <a:off x="4950000" y="2200000"/>
+            <a:ext cx="1900000" cy="350000"/>
+          </a:xfrm>
+          <a:prstGeom prst="roundRect">
+            <a:avLst/>
+          </a:prstGeom>
+          <a:solidFill>
+            <a:srgbClr val="C8E6C9"/>
+          </a:solidFill>
+          <a:ln w="12700">
+            <a:solidFill>
+              <a:srgbClr val="9E9E9E"/>
+            </a:solidFill>
+          </a:ln>
+        </p:spPr>
+        <p:txBody>
+          <a:bodyPr wrap="square" rtlCol="0" anchor="ctr">
+            <a:normAutofit/>
+          </a:bodyPr>
+          <a:lstStyle/>
+          <a:p>
+            <a:pPr algn="ctr"/>
+            <a:r>
+              <a:rPr lang="en-US" sz="1031" dirty="0">
+                <a:solidFill>
+                  <a:srgbClr val="000000"/>
+                </a:solidFill>
+              </a:rPr>
+              <a:t>Create first presentation (4)</a:t>
+            </a:r>
+          </a:p>
+        </p:txBody>
+      </p:sp>
+      <p:sp>
+        <p:nvSpPr>
+          <p:cNvPr id="20" name="Shape 20"/>
+          <p:cNvSpPr/>
+          <p:nvPr/>
+        </p:nvSpPr>
+        <p:spPr>
+          <a:xfrm>
+            <a:off x="4950000" y="2600000"/>
+            <a:ext cx="1900000" cy="350000"/>
+          </a:xfrm>
+          <a:prstGeom prst="roundRect">
+            <a:avLst/>
+          </a:prstGeom>
+          <a:solidFill>
+            <a:srgbClr val="A5D6A7"/>
+          </a:solidFill>
+          <a:ln w="12700">
+            <a:solidFill>
+              <a:srgbClr val="9E9E9E"/>
+            </a:solidFill>
+          </a:ln>
+        </p:spPr>
+        <p:txBody>
+          <a:bodyPr wrap="square" rtlCol="0" anchor="ctr">
+            <a:normAutofit/>
+          </a:bodyPr>
+          <a:lstStyle/>
+          <a:p>
+            <a:pPr algn="ctr"/>
+            <a:r>
+              <a:rPr lang="en-US" sz="1662" dirty="0">
+                <a:solidFill>
+                  <a:srgbClr val="000000"/>
+                </a:solidFill>
+              </a:rPr>
+              <a:t>Export to PPTX (5)</a:t>
+            </a:r>
+          </a:p>
+        </p:txBody>
+      </p:sp>
+      <p:sp>
+        <p:nvSpPr>
+          <p:cNvPr id="21" name="Shape 21"/>
+          <p:cNvSpPr/>
+          <p:nvPr/>
+        </p:nvSpPr>
+        <p:spPr>
+          <a:xfrm>
+            <a:off x="4950000" y="3000000"/>
+            <a:ext cx="1900000" cy="350000"/>
+          </a:xfrm>
+          <a:prstGeom prst="roundRect">
+            <a:avLst/>
+          </a:prstGeom>
+          <a:solidFill>
+            <a:srgbClr val="A5D6A7"/>
+          </a:solidFill>
+          <a:ln w="12700">
+            <a:solidFill>
+              <a:srgbClr val="9E9E9E"/>
+            </a:solidFill>
+          </a:ln>
+        </p:spPr>
+        <p:txBody>
+          <a:bodyPr wrap="square" rtlCol="0" anchor="ctr">
+            <a:normAutofit/>
+          </a:bodyPr>
+          <a:lstStyle/>
+          <a:p>
+            <a:pPr algn="ctr"/>
+            <a:r>
+              <a:rPr lang="en-US" sz="1574" dirty="0">
+                <a:solidFill>
+                  <a:srgbClr val="000000"/>
+                </a:solidFill>
+              </a:rPr>
+              <a:t>Share with team (5)</a:t>
             </a:r>
           </a:p>
         </p:txBody>
@@ -3776,35 +4212,326 @@
         </p:nvSpPr>
         <p:spPr>
           <a:xfrm>
-            <a:off x="1000000" y="2000000"/>
-            <a:ext cx="7000000" cy="3000000"/>
-          </a:xfrm>
-          <a:prstGeom prst="rect">
-            <a:avLst/>
-          </a:prstGeom>
-          <a:solidFill>
-            <a:srgbClr val="F5F5F5"/>
-          </a:solidFill>
-          <a:ln w="1">
+            <a:off x="4000000" y="1800000"/>
+            <a:ext cx="3000000" cy="2000000"/>
+          </a:xfrm>
+          <a:prstGeom prst="rect">
+            <a:avLst/>
+          </a:prstGeom>
+          <a:solidFill>
+            <a:srgbClr val="C8E6C9"/>
+          </a:solidFill>
+          <a:ln w="12700">
             <a:solidFill>
-              <a:srgbClr val="757575"/>
+              <a:srgbClr val="9E9E9E"/>
             </a:solidFill>
           </a:ln>
         </p:spPr>
         <p:txBody>
-          <a:bodyPr wrap="square" rtlCol="0" anchor="ctr">
-            <a:normAutofit/>
-          </a:bodyPr>
-          <a:lstStyle/>
-          <a:p>
-            <a:pPr algn="ctr"/>
-            <a:r>
-              <a:rPr lang="en-US" sz="4400" dirty="0">
-                <a:solidFill>
-                  <a:srgbClr val="000000"/>
-                </a:solidFill>
-              </a:rPr>
-              <a:t>Diagram: quadrantChart</a:t>
+          <a:bodyPr/>
+          <a:lstStyle/>
+          <a:p/>
+        </p:txBody>
+      </p:sp>
+      <p:sp>
+        <p:nvSpPr>
+          <p:cNvPr id="11" name="Shape 11"/>
+          <p:cNvSpPr/>
+          <p:nvPr/>
+        </p:nvSpPr>
+        <p:spPr>
+          <a:xfrm>
+            <a:off x="1000000" y="1800000"/>
+            <a:ext cx="3000000" cy="2000000"/>
+          </a:xfrm>
+          <a:prstGeom prst="rect">
+            <a:avLst/>
+          </a:prstGeom>
+          <a:solidFill>
+            <a:srgbClr val="BBDEFB"/>
+          </a:solidFill>
+          <a:ln w="12700">
+            <a:solidFill>
+              <a:srgbClr val="9E9E9E"/>
+            </a:solidFill>
+          </a:ln>
+        </p:spPr>
+        <p:txBody>
+          <a:bodyPr/>
+          <a:lstStyle/>
+          <a:p/>
+        </p:txBody>
+      </p:sp>
+      <p:sp>
+        <p:nvSpPr>
+          <p:cNvPr id="12" name="Shape 12"/>
+          <p:cNvSpPr/>
+          <p:nvPr/>
+        </p:nvSpPr>
+        <p:spPr>
+          <a:xfrm>
+            <a:off x="1000000" y="3800000"/>
+            <a:ext cx="3000000" cy="2000000"/>
+          </a:xfrm>
+          <a:prstGeom prst="rect">
+            <a:avLst/>
+          </a:prstGeom>
+          <a:solidFill>
+            <a:srgbClr val="FFECB3"/>
+          </a:solidFill>
+          <a:ln w="12700">
+            <a:solidFill>
+              <a:srgbClr val="9E9E9E"/>
+            </a:solidFill>
+          </a:ln>
+        </p:spPr>
+        <p:txBody>
+          <a:bodyPr/>
+          <a:lstStyle/>
+          <a:p/>
+        </p:txBody>
+      </p:sp>
+      <p:sp>
+        <p:nvSpPr>
+          <p:cNvPr id="13" name="Shape 13"/>
+          <p:cNvSpPr/>
+          <p:nvPr/>
+        </p:nvSpPr>
+        <p:spPr>
+          <a:xfrm>
+            <a:off x="4000000" y="3800000"/>
+            <a:ext cx="3000000" cy="2000000"/>
+          </a:xfrm>
+          <a:prstGeom prst="rect">
+            <a:avLst/>
+          </a:prstGeom>
+          <a:solidFill>
+            <a:srgbClr val="FFCDD2"/>
+          </a:solidFill>
+          <a:ln w="12700">
+            <a:solidFill>
+              <a:srgbClr val="9E9E9E"/>
+            </a:solidFill>
+          </a:ln>
+        </p:spPr>
+        <p:txBody>
+          <a:bodyPr/>
+          <a:lstStyle/>
+          <a:p/>
+        </p:txBody>
+      </p:sp>
+      <p:sp>
+        <p:nvSpPr>
+          <p:cNvPr id="14" name="Shape 14"/>
+          <p:cNvSpPr/>
+          <p:nvPr/>
+        </p:nvSpPr>
+        <p:spPr>
+          <a:xfrm>
+            <a:off x="2050000" y="2050000"/>
+            <a:ext cx="300000" cy="300000"/>
+          </a:xfrm>
+          <a:prstGeom prst="ellipse">
+            <a:avLst/>
+          </a:prstGeom>
+          <a:solidFill>
+            <a:srgbClr val="1565C0"/>
+          </a:solidFill>
+        </p:spPr>
+        <p:txBody>
+          <a:bodyPr wrap="square" rtlCol="0" anchor="ctr">
+            <a:normAutofit/>
+          </a:bodyPr>
+          <a:lstStyle/>
+          <a:p>
+            <a:pPr algn="ctr"/>
+            <a:r>
+              <a:rPr lang="en-US" sz="800" dirty="0">
+                <a:solidFill>
+                  <a:srgbClr val="FFFFFF"/>
+                </a:solidFill>
+              </a:rPr>
+              <a:t>Tables:</a:t>
+            </a:r>
+          </a:p>
+        </p:txBody>
+      </p:sp>
+      <p:sp>
+        <p:nvSpPr>
+          <p:cNvPr id="15" name="Shape 15"/>
+          <p:cNvSpPr/>
+          <p:nvPr/>
+        </p:nvSpPr>
+        <p:spPr>
+          <a:xfrm>
+            <a:off x="4450000" y="2249999"/>
+            <a:ext cx="300000" cy="300000"/>
+          </a:xfrm>
+          <a:prstGeom prst="ellipse">
+            <a:avLst/>
+          </a:prstGeom>
+          <a:solidFill>
+            <a:srgbClr val="1565C0"/>
+          </a:solidFill>
+        </p:spPr>
+        <p:txBody>
+          <a:bodyPr wrap="square" rtlCol="0" anchor="ctr">
+            <a:normAutofit/>
+          </a:bodyPr>
+          <a:lstStyle/>
+          <a:p>
+            <a:pPr algn="ctr"/>
+            <a:r>
+              <a:rPr lang="en-US" sz="800" dirty="0">
+                <a:solidFill>
+                  <a:srgbClr val="FFFFFF"/>
+                </a:solidFill>
+              </a:rPr>
+              <a:t>Mermaid:</a:t>
+            </a:r>
+          </a:p>
+        </p:txBody>
+      </p:sp>
+      <p:sp>
+        <p:nvSpPr>
+          <p:cNvPr id="16" name="Shape 16"/>
+          <p:cNvSpPr/>
+          <p:nvPr/>
+        </p:nvSpPr>
+        <p:spPr>
+          <a:xfrm>
+            <a:off x="5650000" y="4050000"/>
+            <a:ext cx="300000" cy="300000"/>
+          </a:xfrm>
+          <a:prstGeom prst="ellipse">
+            <a:avLst/>
+          </a:prstGeom>
+          <a:solidFill>
+            <a:srgbClr val="1565C0"/>
+          </a:solidFill>
+        </p:spPr>
+        <p:txBody>
+          <a:bodyPr wrap="square" rtlCol="0" anchor="ctr">
+            <a:normAutofit/>
+          </a:bodyPr>
+          <a:lstStyle/>
+          <a:p>
+            <a:pPr algn="ctr"/>
+            <a:r>
+              <a:rPr lang="en-US" sz="800" dirty="0">
+                <a:solidFill>
+                  <a:srgbClr val="FFFFFF"/>
+                </a:solidFill>
+              </a:rPr>
+              <a:t>Animations:</a:t>
+            </a:r>
+          </a:p>
+        </p:txBody>
+      </p:sp>
+      <p:sp>
+        <p:nvSpPr>
+          <p:cNvPr id="17" name="Shape 17"/>
+          <p:cNvSpPr/>
+          <p:nvPr/>
+        </p:nvSpPr>
+        <p:spPr>
+          <a:xfrm>
+            <a:off x="2650000" y="3650000"/>
+            <a:ext cx="300000" cy="300000"/>
+          </a:xfrm>
+          <a:prstGeom prst="ellipse">
+            <a:avLst/>
+          </a:prstGeom>
+          <a:solidFill>
+            <a:srgbClr val="1565C0"/>
+          </a:solidFill>
+        </p:spPr>
+        <p:txBody>
+          <a:bodyPr wrap="square" rtlCol="0" anchor="ctr">
+            <a:normAutofit/>
+          </a:bodyPr>
+          <a:lstStyle/>
+          <a:p>
+            <a:pPr algn="ctr"/>
+            <a:r>
+              <a:rPr lang="en-US" sz="800" dirty="0">
+                <a:solidFill>
+                  <a:srgbClr val="FFFFFF"/>
+                </a:solidFill>
+              </a:rPr>
+              <a:t>Themes:</a:t>
+            </a:r>
+          </a:p>
+        </p:txBody>
+      </p:sp>
+      <p:sp>
+        <p:nvSpPr>
+          <p:cNvPr id="18" name="Shape 18"/>
+          <p:cNvSpPr/>
+          <p:nvPr/>
+        </p:nvSpPr>
+        <p:spPr>
+          <a:xfrm>
+            <a:off x="3250000" y="2850000"/>
+            <a:ext cx="300000" cy="300000"/>
+          </a:xfrm>
+          <a:prstGeom prst="ellipse">
+            <a:avLst/>
+          </a:prstGeom>
+          <a:solidFill>
+            <a:srgbClr val="1565C0"/>
+          </a:solidFill>
+        </p:spPr>
+        <p:txBody>
+          <a:bodyPr wrap="square" rtlCol="0" anchor="ctr">
+            <a:normAutofit/>
+          </a:bodyPr>
+          <a:lstStyle/>
+          <a:p>
+            <a:pPr algn="ctr"/>
+            <a:r>
+              <a:rPr lang="en-US" sz="800" dirty="0">
+                <a:solidFill>
+                  <a:srgbClr val="FFFFFF"/>
+                </a:solidFill>
+              </a:rPr>
+              <a:t>Export PDF:</a:t>
+            </a:r>
+          </a:p>
+        </p:txBody>
+      </p:sp>
+      <p:sp>
+        <p:nvSpPr>
+          <p:cNvPr id="19" name="Shape 19"/>
+          <p:cNvSpPr/>
+          <p:nvPr/>
+        </p:nvSpPr>
+        <p:spPr>
+          <a:xfrm>
+            <a:off x="6250000" y="4450000"/>
+            <a:ext cx="300000" cy="300000"/>
+          </a:xfrm>
+          <a:prstGeom prst="ellipse">
+            <a:avLst/>
+          </a:prstGeom>
+          <a:solidFill>
+            <a:srgbClr val="1565C0"/>
+          </a:solidFill>
+        </p:spPr>
+        <p:txBody>
+          <a:bodyPr wrap="square" rtlCol="0" anchor="ctr">
+            <a:normAutofit/>
+          </a:bodyPr>
+          <a:lstStyle/>
+          <a:p>
+            <a:pPr algn="ctr"/>
+            <a:r>
+              <a:rPr lang="en-US" sz="800" dirty="0">
+                <a:solidFill>
+                  <a:srgbClr val="FFFFFF"/>
+                </a:solidFill>
+              </a:rPr>
+              <a:t>3D Models:</a:t>
             </a:r>
           </a:p>
         </p:txBody>
@@ -3875,18 +4602,198 @@
         </p:nvSpPr>
         <p:spPr>
           <a:xfrm>
-            <a:off x="1000000" y="2000000"/>
-            <a:ext cx="7000000" cy="3000000"/>
-          </a:xfrm>
-          <a:prstGeom prst="rect">
-            <a:avLst/>
-          </a:prstGeom>
-          <a:solidFill>
-            <a:srgbClr val="F5F5F5"/>
-          </a:solidFill>
-          <a:ln w="1">
+            <a:off x="200000" y="1900000"/>
+            <a:ext cx="700000" cy="200000"/>
+          </a:xfrm>
+          <a:prstGeom prst="roundRect">
+            <a:avLst/>
+          </a:prstGeom>
+          <a:solidFill>
+            <a:srgbClr val="1565C0"/>
+          </a:solidFill>
+        </p:spPr>
+        <p:txBody>
+          <a:bodyPr wrap="square" rtlCol="0" anchor="ctr">
+            <a:normAutofit/>
+          </a:bodyPr>
+          <a:lstStyle/>
+          <a:p>
+            <a:pPr algn="ctr"/>
+            <a:r>
+              <a:rPr lang="en-US" sz="1259" dirty="0">
+                <a:solidFill>
+                  <a:srgbClr val="FFFFFF"/>
+                </a:solidFill>
+              </a:rPr>
+              <a:t>main</a:t>
+            </a:r>
+          </a:p>
+        </p:txBody>
+      </p:sp>
+      <p:sp>
+        <p:nvSpPr>
+          <p:cNvPr id="11" name="Shape 11"/>
+          <p:cNvSpPr/>
+          <p:nvPr/>
+        </p:nvSpPr>
+        <p:spPr>
+          <a:xfrm>
+            <a:off x="1000000" y="1975000"/>
+            <a:ext cx="6600000" cy="50000"/>
+          </a:xfrm>
+          <a:prstGeom prst="rect">
+            <a:avLst/>
+          </a:prstGeom>
+          <a:solidFill>
+            <a:srgbClr val="1565C0"/>
+          </a:solidFill>
+        </p:spPr>
+        <p:txBody>
+          <a:bodyPr/>
+          <a:lstStyle/>
+          <a:p/>
+        </p:txBody>
+      </p:sp>
+      <p:sp>
+        <p:nvSpPr>
+          <p:cNvPr id="12" name="Shape 12"/>
+          <p:cNvSpPr/>
+          <p:nvPr/>
+        </p:nvSpPr>
+        <p:spPr>
+          <a:xfrm>
+            <a:off x="200000" y="2500000"/>
+            <a:ext cx="700000" cy="200000"/>
+          </a:xfrm>
+          <a:prstGeom prst="roundRect">
+            <a:avLst/>
+          </a:prstGeom>
+          <a:solidFill>
+            <a:srgbClr val="2E7D32"/>
+          </a:solidFill>
+        </p:spPr>
+        <p:txBody>
+          <a:bodyPr wrap="square" rtlCol="0" anchor="ctr">
+            <a:normAutofit/>
+          </a:bodyPr>
+          <a:lstStyle/>
+          <a:p>
+            <a:pPr algn="ctr"/>
+            <a:r>
+              <a:rPr lang="en-US" sz="800" dirty="0">
+                <a:solidFill>
+                  <a:srgbClr val="FFFFFF"/>
+                </a:solidFill>
+              </a:rPr>
+              <a:t>feature/tables</a:t>
+            </a:r>
+          </a:p>
+        </p:txBody>
+      </p:sp>
+      <p:sp>
+        <p:nvSpPr>
+          <p:cNvPr id="13" name="Shape 13"/>
+          <p:cNvSpPr/>
+          <p:nvPr/>
+        </p:nvSpPr>
+        <p:spPr>
+          <a:xfrm>
+            <a:off x="1000000" y="2575000"/>
+            <a:ext cx="6600000" cy="50000"/>
+          </a:xfrm>
+          <a:prstGeom prst="rect">
+            <a:avLst/>
+          </a:prstGeom>
+          <a:solidFill>
+            <a:srgbClr val="2E7D32"/>
+          </a:solidFill>
+        </p:spPr>
+        <p:txBody>
+          <a:bodyPr/>
+          <a:lstStyle/>
+          <a:p/>
+        </p:txBody>
+      </p:sp>
+      <p:sp>
+        <p:nvSpPr>
+          <p:cNvPr id="14" name="Shape 14"/>
+          <p:cNvSpPr/>
+          <p:nvPr/>
+        </p:nvSpPr>
+        <p:spPr>
+          <a:xfrm>
+            <a:off x="200000" y="3100000"/>
+            <a:ext cx="700000" cy="200000"/>
+          </a:xfrm>
+          <a:prstGeom prst="roundRect">
+            <a:avLst/>
+          </a:prstGeom>
+          <a:solidFill>
+            <a:srgbClr val="7B1FA2"/>
+          </a:solidFill>
+        </p:spPr>
+        <p:txBody>
+          <a:bodyPr wrap="square" rtlCol="0" anchor="ctr">
+            <a:normAutofit/>
+          </a:bodyPr>
+          <a:lstStyle/>
+          <a:p>
+            <a:pPr algn="ctr"/>
+            <a:r>
+              <a:rPr lang="en-US" sz="800" dirty="0">
+                <a:solidFill>
+                  <a:srgbClr val="FFFFFF"/>
+                </a:solidFill>
+              </a:rPr>
+              <a:t>feature/mermaid</a:t>
+            </a:r>
+          </a:p>
+        </p:txBody>
+      </p:sp>
+      <p:sp>
+        <p:nvSpPr>
+          <p:cNvPr id="15" name="Shape 15"/>
+          <p:cNvSpPr/>
+          <p:nvPr/>
+        </p:nvSpPr>
+        <p:spPr>
+          <a:xfrm>
+            <a:off x="1000000" y="3175000"/>
+            <a:ext cx="6600000" cy="50000"/>
+          </a:xfrm>
+          <a:prstGeom prst="rect">
+            <a:avLst/>
+          </a:prstGeom>
+          <a:solidFill>
+            <a:srgbClr val="7B1FA2"/>
+          </a:solidFill>
+        </p:spPr>
+        <p:txBody>
+          <a:bodyPr/>
+          <a:lstStyle/>
+          <a:p/>
+        </p:txBody>
+      </p:sp>
+      <p:sp>
+        <p:nvSpPr>
+          <p:cNvPr id="16" name="Shape 16"/>
+          <p:cNvSpPr/>
+          <p:nvPr/>
+        </p:nvSpPr>
+        <p:spPr>
+          <a:xfrm>
+            <a:off x="1000000" y="1850000"/>
+            <a:ext cx="300000" cy="300000"/>
+          </a:xfrm>
+          <a:prstGeom prst="ellipse">
+            <a:avLst/>
+          </a:prstGeom>
+          <a:solidFill>
+            <a:srgbClr val="FFFFFF"/>
+          </a:solidFill>
+          <a:ln w="25400">
             <a:solidFill>
-              <a:srgbClr val="757575"/>
+              <a:srgbClr val="1565C0"/>
             </a:solidFill>
           </a:ln>
         </p:spPr>
@@ -3898,12 +4805,299 @@
           <a:p>
             <a:pPr algn="ctr"/>
             <a:r>
-              <a:rPr lang="en-US" sz="4400" dirty="0">
+              <a:rPr lang="en-US" sz="800" dirty="0">
                 <a:solidFill>
                   <a:srgbClr val="000000"/>
                 </a:solidFill>
               </a:rPr>
-              <a:t>Diagram: gitGraph</a:t>
+              <a:t>Initial</a:t>
+            </a:r>
+          </a:p>
+        </p:txBody>
+      </p:sp>
+      <p:sp>
+        <p:nvSpPr>
+          <p:cNvPr id="17" name="Shape 17"/>
+          <p:cNvSpPr/>
+          <p:nvPr/>
+        </p:nvSpPr>
+        <p:spPr>
+          <a:xfrm>
+            <a:off x="1800000" y="1850000"/>
+            <a:ext cx="300000" cy="300000"/>
+          </a:xfrm>
+          <a:prstGeom prst="ellipse">
+            <a:avLst/>
+          </a:prstGeom>
+          <a:solidFill>
+            <a:srgbClr val="FFFFFF"/>
+          </a:solidFill>
+          <a:ln w="25400">
+            <a:solidFill>
+              <a:srgbClr val="1565C0"/>
+            </a:solidFill>
+          </a:ln>
+        </p:spPr>
+        <p:txBody>
+          <a:bodyPr wrap="square" rtlCol="0" anchor="ctr">
+            <a:normAutofit/>
+          </a:bodyPr>
+          <a:lstStyle/>
+          <a:p>
+            <a:pPr algn="ctr"/>
+            <a:r>
+              <a:rPr lang="en-US" sz="800" dirty="0">
+                <a:solidFill>
+                  <a:srgbClr val="000000"/>
+                </a:solidFill>
+              </a:rPr>
+              <a:t>Core API</a:t>
+            </a:r>
+          </a:p>
+        </p:txBody>
+      </p:sp>
+      <p:sp>
+        <p:nvSpPr>
+          <p:cNvPr id="18" name="Shape 18"/>
+          <p:cNvSpPr/>
+          <p:nvPr/>
+        </p:nvSpPr>
+        <p:spPr>
+          <a:xfrm>
+            <a:off x="2600000" y="1850000"/>
+            <a:ext cx="300000" cy="300000"/>
+          </a:xfrm>
+          <a:prstGeom prst="ellipse">
+            <a:avLst/>
+          </a:prstGeom>
+          <a:solidFill>
+            <a:srgbClr val="FFFFFF"/>
+          </a:solidFill>
+          <a:ln w="25400">
+            <a:solidFill>
+              <a:srgbClr val="1565C0"/>
+            </a:solidFill>
+          </a:ln>
+        </p:spPr>
+        <p:txBody>
+          <a:bodyPr wrap="square" rtlCol="0" anchor="ctr">
+            <a:normAutofit/>
+          </a:bodyPr>
+          <a:lstStyle/>
+          <a:p>
+            <a:pPr algn="ctr"/>
+            <a:r>
+              <a:rPr lang="en-US" sz="800" dirty="0">
+                <a:solidFill>
+                  <a:srgbClr val="000000"/>
+                </a:solidFill>
+              </a:rPr>
+              <a:t>Add tables</a:t>
+            </a:r>
+          </a:p>
+        </p:txBody>
+      </p:sp>
+      <p:sp>
+        <p:nvSpPr>
+          <p:cNvPr id="19" name="Shape 19"/>
+          <p:cNvSpPr/>
+          <p:nvPr/>
+        </p:nvSpPr>
+        <p:spPr>
+          <a:xfrm>
+            <a:off x="3400000" y="1850000"/>
+            <a:ext cx="300000" cy="300000"/>
+          </a:xfrm>
+          <a:prstGeom prst="ellipse">
+            <a:avLst/>
+          </a:prstGeom>
+          <a:solidFill>
+            <a:srgbClr val="FFFFFF"/>
+          </a:solidFill>
+          <a:ln w="25400">
+            <a:solidFill>
+              <a:srgbClr val="1565C0"/>
+            </a:solidFill>
+          </a:ln>
+        </p:spPr>
+        <p:txBody>
+          <a:bodyPr wrap="square" rtlCol="0" anchor="ctr">
+            <a:normAutofit/>
+          </a:bodyPr>
+          <a:lstStyle/>
+          <a:p>
+            <a:pPr algn="ctr"/>
+            <a:r>
+              <a:rPr lang="en-US" sz="800" dirty="0">
+                <a:solidFill>
+                  <a:srgbClr val="000000"/>
+                </a:solidFill>
+              </a:rPr>
+              <a:t>Style tables</a:t>
+            </a:r>
+          </a:p>
+        </p:txBody>
+      </p:sp>
+      <p:sp>
+        <p:nvSpPr>
+          <p:cNvPr id="20" name="Shape 20"/>
+          <p:cNvSpPr/>
+          <p:nvPr/>
+        </p:nvSpPr>
+        <p:spPr>
+          <a:xfrm>
+            <a:off x="4200000" y="1850000"/>
+            <a:ext cx="300000" cy="300000"/>
+          </a:xfrm>
+          <a:prstGeom prst="ellipse">
+            <a:avLst/>
+          </a:prstGeom>
+          <a:solidFill>
+            <a:srgbClr val="FFFFFF"/>
+          </a:solidFill>
+          <a:ln w="25400">
+            <a:solidFill>
+              <a:srgbClr val="1565C0"/>
+            </a:solidFill>
+          </a:ln>
+        </p:spPr>
+        <p:txBody>
+          <a:bodyPr wrap="square" rtlCol="0" anchor="ctr">
+            <a:normAutofit/>
+          </a:bodyPr>
+          <a:lstStyle/>
+          <a:p>
+            <a:pPr algn="ctr"/>
+            <a:r>
+              <a:rPr lang="en-US" sz="800" dirty="0">
+                <a:solidFill>
+                  <a:srgbClr val="000000"/>
+                </a:solidFill>
+              </a:rPr>
+              <a:t>Merge feature/tables</a:t>
+            </a:r>
+          </a:p>
+        </p:txBody>
+      </p:sp>
+      <p:sp>
+        <p:nvSpPr>
+          <p:cNvPr id="21" name="Shape 21"/>
+          <p:cNvSpPr/>
+          <p:nvPr/>
+        </p:nvSpPr>
+        <p:spPr>
+          <a:xfrm>
+            <a:off x="5000000" y="1850000"/>
+            <a:ext cx="300000" cy="300000"/>
+          </a:xfrm>
+          <a:prstGeom prst="ellipse">
+            <a:avLst/>
+          </a:prstGeom>
+          <a:solidFill>
+            <a:srgbClr val="FFFFFF"/>
+          </a:solidFill>
+          <a:ln w="25400">
+            <a:solidFill>
+              <a:srgbClr val="1565C0"/>
+            </a:solidFill>
+          </a:ln>
+        </p:spPr>
+        <p:txBody>
+          <a:bodyPr wrap="square" rtlCol="0" anchor="ctr">
+            <a:normAutofit/>
+          </a:bodyPr>
+          <a:lstStyle/>
+          <a:p>
+            <a:pPr algn="ctr"/>
+            <a:r>
+              <a:rPr lang="en-US" sz="800" dirty="0">
+                <a:solidFill>
+                  <a:srgbClr val="000000"/>
+                </a:solidFill>
+              </a:rPr>
+              <a:t>Add mermaid</a:t>
+            </a:r>
+          </a:p>
+        </p:txBody>
+      </p:sp>
+      <p:sp>
+        <p:nvSpPr>
+          <p:cNvPr id="22" name="Shape 22"/>
+          <p:cNvSpPr/>
+          <p:nvPr/>
+        </p:nvSpPr>
+        <p:spPr>
+          <a:xfrm>
+            <a:off x="5800000" y="1850000"/>
+            <a:ext cx="300000" cy="300000"/>
+          </a:xfrm>
+          <a:prstGeom prst="ellipse">
+            <a:avLst/>
+          </a:prstGeom>
+          <a:solidFill>
+            <a:srgbClr val="FFFFFF"/>
+          </a:solidFill>
+          <a:ln w="25400">
+            <a:solidFill>
+              <a:srgbClr val="1565C0"/>
+            </a:solidFill>
+          </a:ln>
+        </p:spPr>
+        <p:txBody>
+          <a:bodyPr wrap="square" rtlCol="0" anchor="ctr">
+            <a:normAutofit/>
+          </a:bodyPr>
+          <a:lstStyle/>
+          <a:p>
+            <a:pPr algn="ctr"/>
+            <a:r>
+              <a:rPr lang="en-US" sz="800" dirty="0">
+                <a:solidFill>
+                  <a:srgbClr val="000000"/>
+                </a:solidFill>
+              </a:rPr>
+              <a:t>Merge feature/mermaid</a:t>
+            </a:r>
+          </a:p>
+        </p:txBody>
+      </p:sp>
+      <p:sp>
+        <p:nvSpPr>
+          <p:cNvPr id="23" name="Shape 23"/>
+          <p:cNvSpPr/>
+          <p:nvPr/>
+        </p:nvSpPr>
+        <p:spPr>
+          <a:xfrm>
+            <a:off x="6600000" y="1850000"/>
+            <a:ext cx="300000" cy="300000"/>
+          </a:xfrm>
+          <a:prstGeom prst="ellipse">
+            <a:avLst/>
+          </a:prstGeom>
+          <a:solidFill>
+            <a:srgbClr val="FFFFFF"/>
+          </a:solidFill>
+          <a:ln w="25400">
+            <a:solidFill>
+              <a:srgbClr val="1565C0"/>
+            </a:solidFill>
+          </a:ln>
+        </p:spPr>
+        <p:txBody>
+          <a:bodyPr wrap="square" rtlCol="0" anchor="ctr">
+            <a:normAutofit/>
+          </a:bodyPr>
+          <a:lstStyle/>
+          <a:p>
+            <a:pPr algn="ctr"/>
+            <a:r>
+              <a:rPr lang="en-US" sz="800" dirty="0">
+                <a:solidFill>
+                  <a:srgbClr val="000000"/>
+                </a:solidFill>
+              </a:rPr>
+              <a:t>Release v1.0</a:t>
             </a:r>
           </a:p>
         </p:txBody>

</xml_diff>

<commit_message>
Add gradient fills, transparency support, and diagram helper functions to simplify Mermaid rendering
- Add `GradientDirection` enum (Horizontal, Vertical, DiagonalDown, DiagonalUp, Angle) with angle conversion to OOXML format
- Add `GradientStop` for multi-color gradients with position and transparency support
- Add `GradientFill` with `linear()` and `three_color()` constructors for gradient creation
- Add `FillType` enum to distinguish solid, gradient, and no-fill types
- Add `Shape::with_gradient()` builder
</commit_message>
<xml_diff>
--- a/examples/md2ppt_demo.pptx
+++ b/examples/md2ppt_demo.pptx
@@ -1443,7 +1443,7 @@
                   <a:srgbClr val="FFFFFF"/>
                 </a:solidFill>
               </a:rPr>
-              <a:t>LINE_ITEM</a:t>
+              <a:t>PRODUCT</a:t>
             </a:r>
           </a:p>
         </p:txBody>
@@ -1485,9 +1485,9 @@
                 </a:solidFill>
               </a:rPr>
               <a:t>int id PK
-int order_id FK
-int product_id FK
-int quantity</a:t>
+string name
+decimal price
+int stock</a:t>
             </a:r>
           </a:p>
         </p:txBody>
@@ -1613,7 +1613,7 @@
                   <a:srgbClr val="FFFFFF"/>
                 </a:solidFill>
               </a:rPr>
-              <a:t>PRODUCT</a:t>
+              <a:t>LINE_ITEM</a:t>
             </a:r>
           </a:p>
         </p:txBody>
@@ -1655,9 +1655,9 @@
                 </a:solidFill>
               </a:rPr>
               <a:t>int id PK
-string name
-decimal price
-int stock</a:t>
+int order_id FK
+int product_id FK
+int quantity</a:t>
             </a:r>
           </a:p>
         </p:txBody>
@@ -1796,7 +1796,7 @@
         </p:nvSpPr>
         <p:spPr>
           <a:xfrm>
-            <a:off x="2672000" y="2094000"/>
+            <a:off x="5472000" y="2094000"/>
             <a:ext cx="1000000" cy="250000"/>
           </a:xfrm>
           <a:prstGeom prst="roundRect">
@@ -1900,15 +1900,15 @@
         <p:nvCxnSpPr>
           <p:cNvPr id="62" name="Connector 62"/>
           <p:cNvCxnSpPr>
-            <a:stCxn id="12" idx="3"/>
-            <a:endCxn id="10" idx="1"/>
+            <a:stCxn id="12" idx="1"/>
+            <a:endCxn id="14" idx="3"/>
           </p:cNvCxnSpPr>
           <p:nvPr/>
         </p:nvCxnSpPr>
         <p:spPr>
-          <a:xfrm flipH="1">
-            <a:off x="672000" y="2219000"/>
-            <a:ext cx="5000000" cy="0"/>
+          <a:xfrm>
+            <a:off x="5672000" y="2219000"/>
+            <a:ext cx="600000" cy="0"/>
           </a:xfrm>
           <a:prstGeom prst="bentConnector3">
             <a:avLst/>
@@ -1926,15 +1926,15 @@
         <p:nvCxnSpPr>
           <p:cNvPr id="63" name="Connector 63"/>
           <p:cNvCxnSpPr>
-            <a:stCxn id="14" idx="3"/>
-            <a:endCxn id="10" idx="1"/>
+            <a:stCxn id="10" idx="1"/>
+            <a:endCxn id="14" idx="3"/>
           </p:cNvCxnSpPr>
           <p:nvPr/>
         </p:nvCxnSpPr>
         <p:spPr>
-          <a:xfrm flipH="1">
-            <a:off x="672000" y="2219000"/>
-            <a:ext cx="7800000" cy="0"/>
+          <a:xfrm>
+            <a:off x="2872000" y="2219000"/>
+            <a:ext cx="3400000" cy="0"/>
           </a:xfrm>
           <a:prstGeom prst="bentConnector3">
             <a:avLst/>
@@ -4407,7 +4407,7 @@
         </p:nvSpPr>
         <p:spPr>
           <a:xfrm>
-            <a:off x="4272000" y="2029000"/>
+            <a:off x="4372000" y="2029000"/>
             <a:ext cx="3000000" cy="2000000"/>
           </a:xfrm>
           <a:prstGeom prst="rect">
@@ -4436,7 +4436,7 @@
         </p:nvSpPr>
         <p:spPr>
           <a:xfrm>
-            <a:off x="1272000" y="2029000"/>
+            <a:off x="1372000" y="2029000"/>
             <a:ext cx="3000000" cy="2000000"/>
           </a:xfrm>
           <a:prstGeom prst="rect">
@@ -4465,7 +4465,7 @@
         </p:nvSpPr>
         <p:spPr>
           <a:xfrm>
-            <a:off x="1272000" y="4029000"/>
+            <a:off x="1372000" y="4029000"/>
             <a:ext cx="3000000" cy="2000000"/>
           </a:xfrm>
           <a:prstGeom prst="rect">
@@ -4494,7 +4494,7 @@
         </p:nvSpPr>
         <p:spPr>
           <a:xfrm>
-            <a:off x="4272000" y="4029000"/>
+            <a:off x="4372000" y="4029000"/>
             <a:ext cx="3000000" cy="2000000"/>
           </a:xfrm>
           <a:prstGeom prst="rect">
@@ -4523,7 +4523,7 @@
         </p:nvSpPr>
         <p:spPr>
           <a:xfrm>
-            <a:off x="2322000" y="2279000"/>
+            <a:off x="2422000" y="2279000"/>
             <a:ext cx="300000" cy="300000"/>
           </a:xfrm>
           <a:prstGeom prst="ellipse">
@@ -4547,8 +4547,8 @@
         </p:nvSpPr>
         <p:spPr>
           <a:xfrm>
-            <a:off x="2672000" y="2329000"/>
-            <a:ext cx="1000000" cy="200000"/>
+            <a:off x="2772000" y="2329000"/>
+            <a:ext cx="800000" cy="200000"/>
           </a:xfrm>
           <a:prstGeom prst="rect">
             <a:avLst/>
@@ -4580,7 +4580,7 @@
         </p:nvSpPr>
         <p:spPr>
           <a:xfrm>
-            <a:off x="4722000" y="2478999"/>
+            <a:off x="4822000" y="2478999"/>
             <a:ext cx="300000" cy="300000"/>
           </a:xfrm>
           <a:prstGeom prst="ellipse">
@@ -4604,8 +4604,8 @@
         </p:nvSpPr>
         <p:spPr>
           <a:xfrm>
-            <a:off x="5072000" y="2528999"/>
-            <a:ext cx="1000000" cy="200000"/>
+            <a:off x="5172000" y="2528999"/>
+            <a:ext cx="800000" cy="200000"/>
           </a:xfrm>
           <a:prstGeom prst="rect">
             <a:avLst/>
@@ -4637,7 +4637,7 @@
         </p:nvSpPr>
         <p:spPr>
           <a:xfrm>
-            <a:off x="5922000" y="4279000"/>
+            <a:off x="6022000" y="4279000"/>
             <a:ext cx="300000" cy="300000"/>
           </a:xfrm>
           <a:prstGeom prst="ellipse">
@@ -4661,8 +4661,8 @@
         </p:nvSpPr>
         <p:spPr>
           <a:xfrm>
-            <a:off x="6272000" y="4329000"/>
-            <a:ext cx="1000000" cy="200000"/>
+            <a:off x="6372000" y="4329000"/>
+            <a:ext cx="800000" cy="200000"/>
           </a:xfrm>
           <a:prstGeom prst="rect">
             <a:avLst/>
@@ -4676,25 +4676,82 @@
           <a:p>
             <a:pPr algn="ctr"/>
             <a:r>
+              <a:rPr lang="en-US" sz="1145" dirty="0">
+                <a:solidFill>
+                  <a:srgbClr val="000000"/>
+                </a:solidFill>
+              </a:rPr>
+              <a:t>Animations:</a:t>
+            </a:r>
+          </a:p>
+        </p:txBody>
+      </p:sp>
+      <p:sp>
+        <p:nvSpPr>
+          <p:cNvPr id="20" name="Shape 20"/>
+          <p:cNvSpPr/>
+          <p:nvPr/>
+        </p:nvSpPr>
+        <p:spPr>
+          <a:xfrm>
+            <a:off x="3022000" y="3879000"/>
+            <a:ext cx="300000" cy="300000"/>
+          </a:xfrm>
+          <a:prstGeom prst="ellipse">
+            <a:avLst/>
+          </a:prstGeom>
+          <a:solidFill>
+            <a:srgbClr val="1565C0"/>
+          </a:solidFill>
+        </p:spPr>
+        <p:txBody>
+          <a:bodyPr/>
+          <a:lstStyle/>
+          <a:p/>
+        </p:txBody>
+      </p:sp>
+      <p:sp>
+        <p:nvSpPr>
+          <p:cNvPr id="21" name="Shape 21"/>
+          <p:cNvSpPr/>
+          <p:nvPr/>
+        </p:nvSpPr>
+        <p:spPr>
+          <a:xfrm>
+            <a:off x="3372000" y="3929000"/>
+            <a:ext cx="800000" cy="200000"/>
+          </a:xfrm>
+          <a:prstGeom prst="rect">
+            <a:avLst/>
+          </a:prstGeom>
+        </p:spPr>
+        <p:txBody>
+          <a:bodyPr wrap="square" rtlCol="0" anchor="ctr">
+            <a:normAutofit/>
+          </a:bodyPr>
+          <a:lstStyle/>
+          <a:p>
+            <a:pPr algn="ctr"/>
+            <a:r>
               <a:rPr lang="en-US" sz="1259" dirty="0">
                 <a:solidFill>
                   <a:srgbClr val="000000"/>
                 </a:solidFill>
               </a:rPr>
-              <a:t>Animations:</a:t>
-            </a:r>
-          </a:p>
-        </p:txBody>
-      </p:sp>
-      <p:sp>
-        <p:nvSpPr>
-          <p:cNvPr id="20" name="Shape 20"/>
-          <p:cNvSpPr/>
-          <p:nvPr/>
-        </p:nvSpPr>
-        <p:spPr>
-          <a:xfrm>
-            <a:off x="2922000" y="3879000"/>
+              <a:t>Themes:</a:t>
+            </a:r>
+          </a:p>
+        </p:txBody>
+      </p:sp>
+      <p:sp>
+        <p:nvSpPr>
+          <p:cNvPr id="22" name="Shape 22"/>
+          <p:cNvSpPr/>
+          <p:nvPr/>
+        </p:nvSpPr>
+        <p:spPr>
+          <a:xfrm>
+            <a:off x="3622000" y="3079000"/>
             <a:ext cx="300000" cy="300000"/>
           </a:xfrm>
           <a:prstGeom prst="ellipse">
@@ -4712,14 +4769,14 @@
       </p:sp>
       <p:sp>
         <p:nvSpPr>
-          <p:cNvPr id="21" name="Shape 21"/>
-          <p:cNvSpPr/>
-          <p:nvPr/>
-        </p:nvSpPr>
-        <p:spPr>
-          <a:xfrm>
-            <a:off x="3272000" y="3929000"/>
-            <a:ext cx="1000000" cy="200000"/>
+          <p:cNvPr id="23" name="Shape 23"/>
+          <p:cNvSpPr/>
+          <p:nvPr/>
+        </p:nvSpPr>
+        <p:spPr>
+          <a:xfrm>
+            <a:off x="3972000" y="3129000"/>
+            <a:ext cx="800000" cy="200000"/>
           </a:xfrm>
           <a:prstGeom prst="rect">
             <a:avLst/>
@@ -4733,25 +4790,25 @@
           <a:p>
             <a:pPr algn="ctr"/>
             <a:r>
-              <a:rPr lang="en-US" sz="1259" dirty="0">
+              <a:rPr lang="en-US" sz="1145" dirty="0">
                 <a:solidFill>
                   <a:srgbClr val="000000"/>
                 </a:solidFill>
               </a:rPr>
-              <a:t>Themes:</a:t>
-            </a:r>
-          </a:p>
-        </p:txBody>
-      </p:sp>
-      <p:sp>
-        <p:nvSpPr>
-          <p:cNvPr id="22" name="Shape 22"/>
-          <p:cNvSpPr/>
-          <p:nvPr/>
-        </p:nvSpPr>
-        <p:spPr>
-          <a:xfrm>
-            <a:off x="3522000" y="3079000"/>
+              <a:t>Export PDF:</a:t>
+            </a:r>
+          </a:p>
+        </p:txBody>
+      </p:sp>
+      <p:sp>
+        <p:nvSpPr>
+          <p:cNvPr id="24" name="Shape 24"/>
+          <p:cNvSpPr/>
+          <p:nvPr/>
+        </p:nvSpPr>
+        <p:spPr>
+          <a:xfrm>
+            <a:off x="6622000" y="4679000"/>
             <a:ext cx="300000" cy="300000"/>
           </a:xfrm>
           <a:prstGeom prst="ellipse">
@@ -4769,71 +4826,14 @@
       </p:sp>
       <p:sp>
         <p:nvSpPr>
-          <p:cNvPr id="23" name="Shape 23"/>
-          <p:cNvSpPr/>
-          <p:nvPr/>
-        </p:nvSpPr>
-        <p:spPr>
-          <a:xfrm>
-            <a:off x="3872000" y="3129000"/>
-            <a:ext cx="1000000" cy="200000"/>
-          </a:xfrm>
-          <a:prstGeom prst="rect">
-            <a:avLst/>
-          </a:prstGeom>
-        </p:spPr>
-        <p:txBody>
-          <a:bodyPr wrap="square" rtlCol="0" anchor="ctr">
-            <a:normAutofit/>
-          </a:bodyPr>
-          <a:lstStyle/>
-          <a:p>
-            <a:pPr algn="ctr"/>
-            <a:r>
-              <a:rPr lang="en-US" sz="1259" dirty="0">
-                <a:solidFill>
-                  <a:srgbClr val="000000"/>
-                </a:solidFill>
-              </a:rPr>
-              <a:t>Export PDF:</a:t>
-            </a:r>
-          </a:p>
-        </p:txBody>
-      </p:sp>
-      <p:sp>
-        <p:nvSpPr>
-          <p:cNvPr id="24" name="Shape 24"/>
-          <p:cNvSpPr/>
-          <p:nvPr/>
-        </p:nvSpPr>
-        <p:spPr>
-          <a:xfrm>
-            <a:off x="6522000" y="4679000"/>
-            <a:ext cx="300000" cy="300000"/>
-          </a:xfrm>
-          <a:prstGeom prst="ellipse">
-            <a:avLst/>
-          </a:prstGeom>
-          <a:solidFill>
-            <a:srgbClr val="1565C0"/>
-          </a:solidFill>
-        </p:spPr>
-        <p:txBody>
-          <a:bodyPr/>
-          <a:lstStyle/>
-          <a:p/>
-        </p:txBody>
-      </p:sp>
-      <p:sp>
-        <p:nvSpPr>
           <p:cNvPr id="25" name="Shape 25"/>
           <p:cNvSpPr/>
           <p:nvPr/>
         </p:nvSpPr>
         <p:spPr>
           <a:xfrm>
-            <a:off x="6872000" y="4729000"/>
-            <a:ext cx="1000000" cy="200000"/>
+            <a:off x="6972000" y="4729000"/>
+            <a:ext cx="800000" cy="200000"/>
           </a:xfrm>
           <a:prstGeom prst="rect">
             <a:avLst/>
@@ -5666,7 +5666,7 @@
           <a:solidFill>
             <a:srgbClr val="3949AB"/>
           </a:solidFill>
-          <a:ln w="2">
+          <a:ln w="12700">
             <a:solidFill>
               <a:srgbClr val="1A237E"/>
             </a:solidFill>
@@ -5686,8 +5686,8 @@
         </p:nvSpPr>
         <p:spPr>
           <a:xfrm>
-            <a:off x="3100000" y="2850000"/>
-            <a:ext cx="1800000" cy="300000"/>
+            <a:off x="3050000" y="2750000"/>
+            <a:ext cx="1900000" cy="500000"/>
           </a:xfrm>
           <a:prstGeom prst="rect">
             <a:avLst/>
@@ -5701,7 +5701,7 @@
           <a:p>
             <a:pPr algn="ctr"/>
             <a:r>
-              <a:rPr lang="en-US" sz="1889" dirty="0">
+              <a:rPr lang="en-US" sz="2493" dirty="0">
                 <a:solidFill>
                   <a:srgbClr val="000000"/>
                 </a:solidFill>
@@ -5956,7 +5956,7 @@
           <a:solidFill>
             <a:srgbClr val="E8EAF6"/>
           </a:solidFill>
-          <a:ln w="1">
+          <a:ln w="12700">
             <a:solidFill>
               <a:srgbClr val="3949AB"/>
             </a:solidFill>
@@ -6018,7 +6018,7 @@
           <a:solidFill>
             <a:srgbClr val="E8EAF6"/>
           </a:solidFill>
-          <a:ln w="1">
+          <a:ln w="12700">
             <a:solidFill>
               <a:srgbClr val="3949AB"/>
             </a:solidFill>
@@ -6080,7 +6080,7 @@
           <a:solidFill>
             <a:srgbClr val="E8EAF6"/>
           </a:solidFill>
-          <a:ln w="1">
+          <a:ln w="12700">
             <a:solidFill>
               <a:srgbClr val="3949AB"/>
             </a:solidFill>
@@ -6142,7 +6142,7 @@
           <a:solidFill>
             <a:srgbClr val="E8EAF6"/>
           </a:solidFill>
-          <a:ln w="1">
+          <a:ln w="12700">
             <a:solidFill>
               <a:srgbClr val="3949AB"/>
             </a:solidFill>
@@ -6204,7 +6204,7 @@
           <a:solidFill>
             <a:srgbClr val="E8EAF6"/>
           </a:solidFill>
-          <a:ln w="1">
+          <a:ln w="12700">
             <a:solidFill>
               <a:srgbClr val="3949AB"/>
             </a:solidFill>
@@ -6266,7 +6266,7 @@
           <a:solidFill>
             <a:srgbClr val="E8EAF6"/>
           </a:solidFill>
-          <a:ln w="1">
+          <a:ln w="12700">
             <a:solidFill>
               <a:srgbClr val="3949AB"/>
             </a:solidFill>
@@ -6328,7 +6328,7 @@
           <a:solidFill>
             <a:srgbClr val="E8EAF6"/>
           </a:solidFill>
-          <a:ln w="1">
+          <a:ln w="12700">
             <a:solidFill>
               <a:srgbClr val="3949AB"/>
             </a:solidFill>
@@ -6390,7 +6390,7 @@
           <a:solidFill>
             <a:srgbClr val="E8EAF6"/>
           </a:solidFill>
-          <a:ln w="1">
+          <a:ln w="12700">
             <a:solidFill>
               <a:srgbClr val="3949AB"/>
             </a:solidFill>
@@ -6452,7 +6452,7 @@
           <a:solidFill>
             <a:srgbClr val="E8EAF6"/>
           </a:solidFill>
-          <a:ln w="1">
+          <a:ln w="12700">
             <a:solidFill>
               <a:srgbClr val="3949AB"/>
             </a:solidFill>
@@ -6514,7 +6514,7 @@
           <a:solidFill>
             <a:srgbClr val="E8EAF6"/>
           </a:solidFill>
-          <a:ln w="1">
+          <a:ln w="12700">
             <a:solidFill>
               <a:srgbClr val="3949AB"/>
             </a:solidFill>
@@ -6576,7 +6576,7 @@
           <a:solidFill>
             <a:srgbClr val="E8EAF6"/>
           </a:solidFill>
-          <a:ln w="1">
+          <a:ln w="12700">
             <a:solidFill>
               <a:srgbClr val="3949AB"/>
             </a:solidFill>
@@ -6638,7 +6638,7 @@
           <a:solidFill>
             <a:srgbClr val="E8EAF6"/>
           </a:solidFill>
-          <a:ln w="1">
+          <a:ln w="12700">
             <a:solidFill>
               <a:srgbClr val="3949AB"/>
             </a:solidFill>
@@ -6700,7 +6700,7 @@
           <a:solidFill>
             <a:srgbClr val="E8EAF6"/>
           </a:solidFill>
-          <a:ln w="1">
+          <a:ln w="12700">
             <a:solidFill>
               <a:srgbClr val="3949AB"/>
             </a:solidFill>

</xml_diff>

<commit_message>
Add prelude module with simplified API, gradient fills, transparency, and styled connectors (v0.1.8)
- Add `prelude.rs` module with simplified API for common use cases
- Add `pptx!()` macro for quick presentation creation with fluent builder API
- Add `shape!()` macro for quick shape creation
- Add `QuickPptx` builder with `.slide()`, `.title_slide()`, `.shapes_slide()` methods
- Add unit conversion helpers: `inches()`, `cm()`, `pt()`
- Add shape builders: `shapes::rect()`, `shapes::circle()`, `shapes::text
</commit_message>
<xml_diff>
--- a/examples/md2ppt_demo.pptx
+++ b/examples/md2ppt_demo.pptx
@@ -1443,7 +1443,7 @@
                   <a:srgbClr val="FFFFFF"/>
                 </a:solidFill>
               </a:rPr>
-              <a:t>PRODUCT</a:t>
+              <a:t>USER</a:t>
             </a:r>
           </a:p>
         </p:txBody>
@@ -1486,8 +1486,8 @@
               </a:rPr>
               <a:t>int id PK
 string name
-decimal price
-int stock</a:t>
+string email
+date created_at</a:t>
             </a:r>
           </a:p>
         </p:txBody>
@@ -1613,7 +1613,7 @@
                   <a:srgbClr val="FFFFFF"/>
                 </a:solidFill>
               </a:rPr>
-              <a:t>LINE_ITEM</a:t>
+              <a:t>PRODUCT</a:t>
             </a:r>
           </a:p>
         </p:txBody>
@@ -1655,9 +1655,9 @@
                 </a:solidFill>
               </a:rPr>
               <a:t>int id PK
-int order_id FK
-int product_id FK
-int quantity</a:t>
+string name
+decimal price
+int stock</a:t>
             </a:r>
           </a:p>
         </p:txBody>
@@ -1698,7 +1698,7 @@
                   <a:srgbClr val="FFFFFF"/>
                 </a:solidFill>
               </a:rPr>
-              <a:t>USER</a:t>
+              <a:t>LINE_ITEM</a:t>
             </a:r>
           </a:p>
         </p:txBody>
@@ -1740,9 +1740,9 @@
                 </a:solidFill>
               </a:rPr>
               <a:t>int id PK
-string name
-string email
-date created_at</a:t>
+int order_id FK
+int product_id FK
+int quantity</a:t>
             </a:r>
           </a:p>
         </p:txBody>
@@ -1755,7 +1755,7 @@
         </p:nvSpPr>
         <p:spPr>
           <a:xfrm>
-            <a:off x="2672000" y="3344000"/>
+            <a:off x="2672000" y="2094000"/>
             <a:ext cx="1000000" cy="250000"/>
           </a:xfrm>
           <a:prstGeom prst="roundRect">
@@ -1796,7 +1796,7 @@
         </p:nvSpPr>
         <p:spPr>
           <a:xfrm>
-            <a:off x="5472000" y="2094000"/>
+            <a:off x="2672000" y="3344000"/>
             <a:ext cx="1000000" cy="250000"/>
           </a:xfrm>
           <a:prstGeom prst="roundRect">
@@ -1837,7 +1837,7 @@
         </p:nvSpPr>
         <p:spPr>
           <a:xfrm>
-            <a:off x="4072000" y="2094000"/>
+            <a:off x="4072000" y="3344000"/>
             <a:ext cx="1000000" cy="250000"/>
           </a:xfrm>
           <a:prstGeom prst="roundRect">
@@ -1874,15 +1874,15 @@
         <p:nvCxnSpPr>
           <p:cNvPr id="61" name="Connector 61"/>
           <p:cNvCxnSpPr>
-            <a:stCxn id="16" idx="1"/>
+            <a:stCxn id="10" idx="1"/>
             <a:endCxn id="12" idx="3"/>
           </p:cNvCxnSpPr>
           <p:nvPr/>
         </p:nvCxnSpPr>
         <p:spPr>
-          <a:xfrm flipV="1">
+          <a:xfrm>
             <a:off x="2872000" y="2219000"/>
-            <a:ext cx="600000" cy="2500000"/>
+            <a:ext cx="600000" cy="0"/>
           </a:xfrm>
           <a:prstGeom prst="bentConnector3">
             <a:avLst/>
@@ -1900,15 +1900,15 @@
         <p:nvCxnSpPr>
           <p:cNvPr id="62" name="Connector 62"/>
           <p:cNvCxnSpPr>
-            <a:stCxn id="12" idx="1"/>
-            <a:endCxn id="14" idx="3"/>
+            <a:stCxn id="12" idx="3"/>
+            <a:endCxn id="16" idx="1"/>
           </p:cNvCxnSpPr>
           <p:nvPr/>
         </p:nvCxnSpPr>
         <p:spPr>
-          <a:xfrm>
-            <a:off x="5672000" y="2219000"/>
-            <a:ext cx="600000" cy="0"/>
+          <a:xfrm flipH="1">
+            <a:off x="672000" y="2219000"/>
+            <a:ext cx="5000000" cy="2500000"/>
           </a:xfrm>
           <a:prstGeom prst="bentConnector3">
             <a:avLst/>
@@ -1926,15 +1926,15 @@
         <p:nvCxnSpPr>
           <p:cNvPr id="63" name="Connector 63"/>
           <p:cNvCxnSpPr>
-            <a:stCxn id="10" idx="1"/>
-            <a:endCxn id="14" idx="3"/>
+            <a:stCxn id="14" idx="3"/>
+            <a:endCxn id="16" idx="1"/>
           </p:cNvCxnSpPr>
           <p:nvPr/>
         </p:nvCxnSpPr>
         <p:spPr>
-          <a:xfrm>
-            <a:off x="2872000" y="2219000"/>
-            <a:ext cx="3400000" cy="0"/>
+          <a:xfrm flipH="1">
+            <a:off x="672000" y="2219000"/>
+            <a:ext cx="7800000" cy="2500000"/>
           </a:xfrm>
           <a:prstGeom prst="bentConnector3">
             <a:avLst/>

</xml_diff>

<commit_message>
Update demo PPTX files with latest rendering improvements (gradient fills, transparency, connector anchoring, and auto-fit text)
</commit_message>
<xml_diff>
--- a/examples/md2ppt_demo.pptx
+++ b/examples/md2ppt_demo.pptx
@@ -1443,7 +1443,7 @@
                   <a:srgbClr val="FFFFFF"/>
                 </a:solidFill>
               </a:rPr>
-              <a:t>USER</a:t>
+              <a:t>LINE_ITEM</a:t>
             </a:r>
           </a:p>
         </p:txBody>
@@ -1485,9 +1485,9 @@
                 </a:solidFill>
               </a:rPr>
               <a:t>int id PK
-string name
-string email
-date created_at</a:t>
+int order_id FK
+int product_id FK
+int quantity</a:t>
             </a:r>
           </a:p>
         </p:txBody>
@@ -1528,7 +1528,7 @@
                   <a:srgbClr val="FFFFFF"/>
                 </a:solidFill>
               </a:rPr>
-              <a:t>ORDER</a:t>
+              <a:t>PRODUCT</a:t>
             </a:r>
           </a:p>
         </p:txBody>
@@ -1570,9 +1570,9 @@
                 </a:solidFill>
               </a:rPr>
               <a:t>int id PK
-int user_id FK
-date order_date
-decimal total</a:t>
+string name
+decimal price
+int stock</a:t>
             </a:r>
           </a:p>
         </p:txBody>
@@ -1613,7 +1613,7 @@
                   <a:srgbClr val="FFFFFF"/>
                 </a:solidFill>
               </a:rPr>
-              <a:t>PRODUCT</a:t>
+              <a:t>USER</a:t>
             </a:r>
           </a:p>
         </p:txBody>
@@ -1656,8 +1656,8 @@
               </a:rPr>
               <a:t>int id PK
 string name
-decimal price
-int stock</a:t>
+string email
+date created_at</a:t>
             </a:r>
           </a:p>
         </p:txBody>
@@ -1698,7 +1698,7 @@
                   <a:srgbClr val="FFFFFF"/>
                 </a:solidFill>
               </a:rPr>
-              <a:t>LINE_ITEM</a:t>
+              <a:t>ORDER</a:t>
             </a:r>
           </a:p>
         </p:txBody>
@@ -1740,9 +1740,9 @@
                 </a:solidFill>
               </a:rPr>
               <a:t>int id PK
-int order_id FK
-int product_id FK
-int quantity</a:t>
+int user_id FK
+date order_date
+decimal total</a:t>
             </a:r>
           </a:p>
         </p:txBody>
@@ -1755,7 +1755,7 @@
         </p:nvSpPr>
         <p:spPr>
           <a:xfrm>
-            <a:off x="2672000" y="2094000"/>
+            <a:off x="4072000" y="3344000"/>
             <a:ext cx="1000000" cy="250000"/>
           </a:xfrm>
           <a:prstGeom prst="roundRect">
@@ -1796,7 +1796,7 @@
         </p:nvSpPr>
         <p:spPr>
           <a:xfrm>
-            <a:off x="2672000" y="3344000"/>
+            <a:off x="1272000" y="3344000"/>
             <a:ext cx="1000000" cy="250000"/>
           </a:xfrm>
           <a:prstGeom prst="roundRect">
@@ -1837,7 +1837,7 @@
         </p:nvSpPr>
         <p:spPr>
           <a:xfrm>
-            <a:off x="4072000" y="3344000"/>
+            <a:off x="2672000" y="2094000"/>
             <a:ext cx="1000000" cy="250000"/>
           </a:xfrm>
           <a:prstGeom prst="roundRect">
@@ -1874,15 +1874,15 @@
         <p:nvCxnSpPr>
           <p:cNvPr id="61" name="Connector 61"/>
           <p:cNvCxnSpPr>
-            <a:stCxn id="10" idx="1"/>
-            <a:endCxn id="12" idx="3"/>
+            <a:stCxn id="14" idx="3"/>
+            <a:endCxn id="16" idx="1"/>
           </p:cNvCxnSpPr>
           <p:nvPr/>
         </p:nvCxnSpPr>
         <p:spPr>
-          <a:xfrm>
-            <a:off x="2872000" y="2219000"/>
-            <a:ext cx="600000" cy="0"/>
+          <a:xfrm flipH="1">
+            <a:off x="672000" y="2219000"/>
+            <a:ext cx="7800000" cy="2500000"/>
           </a:xfrm>
           <a:prstGeom prst="bentConnector3">
             <a:avLst/>
@@ -1900,15 +1900,15 @@
         <p:nvCxnSpPr>
           <p:cNvPr id="62" name="Connector 62"/>
           <p:cNvCxnSpPr>
-            <a:stCxn id="12" idx="3"/>
-            <a:endCxn id="16" idx="1"/>
+            <a:stCxn id="16" idx="0"/>
+            <a:endCxn id="10" idx="2"/>
           </p:cNvCxnSpPr>
           <p:nvPr/>
         </p:nvCxnSpPr>
         <p:spPr>
-          <a:xfrm flipH="1">
+          <a:xfrm flipH="1" flipV="1">
             <a:off x="672000" y="2219000"/>
-            <a:ext cx="5000000" cy="2500000"/>
+            <a:ext cx="2200000" cy="2500000"/>
           </a:xfrm>
           <a:prstGeom prst="bentConnector3">
             <a:avLst/>
@@ -1926,15 +1926,15 @@
         <p:nvCxnSpPr>
           <p:cNvPr id="63" name="Connector 63"/>
           <p:cNvCxnSpPr>
-            <a:stCxn id="14" idx="3"/>
-            <a:endCxn id="16" idx="1"/>
+            <a:stCxn id="12" idx="3"/>
+            <a:endCxn id="10" idx="1"/>
           </p:cNvCxnSpPr>
           <p:nvPr/>
         </p:nvCxnSpPr>
         <p:spPr>
           <a:xfrm flipH="1">
             <a:off x="672000" y="2219000"/>
-            <a:ext cx="7800000" cy="2500000"/>
+            <a:ext cx="5000000" cy="0"/>
           </a:xfrm>
           <a:prstGeom prst="bentConnector3">
             <a:avLst/>

</xml_diff>